<commit_message>
Update to second webinar materials
</commit_message>
<xml_diff>
--- a/101-B/presentation/markupuk-2020-101-B.pptx
+++ b/101-B/presentation/markupuk-2020-101-B.pptx
@@ -5,10 +5,10 @@
     <p:sldMasterId id="2147483648" r:id="rId1"/>
   </p:sldMasterIdLst>
   <p:notesMasterIdLst>
-    <p:notesMasterId r:id="rId21"/>
+    <p:notesMasterId r:id="rId22"/>
   </p:notesMasterIdLst>
   <p:handoutMasterIdLst>
-    <p:handoutMasterId r:id="rId22"/>
+    <p:handoutMasterId r:id="rId23"/>
   </p:handoutMasterIdLst>
   <p:sldIdLst>
     <p:sldId id="256" r:id="rId2"/>
@@ -27,12 +27,13 @@
     <p:sldId id="324" r:id="rId15"/>
     <p:sldId id="350" r:id="rId16"/>
     <p:sldId id="352" r:id="rId17"/>
-    <p:sldId id="347" r:id="rId18"/>
-    <p:sldId id="330" r:id="rId19"/>
-    <p:sldId id="292" r:id="rId20"/>
+    <p:sldId id="353" r:id="rId18"/>
+    <p:sldId id="347" r:id="rId19"/>
+    <p:sldId id="330" r:id="rId20"/>
+    <p:sldId id="292" r:id="rId21"/>
   </p:sldIdLst>
   <p:sldSz cx="12192000" cy="6858000"/>
-  <p:notesSz cx="6858000" cy="9144000"/>
+  <p:notesSz cx="6797675" cy="9872663"/>
   <p:defaultTextStyle>
     <a:defPPr>
       <a:defRPr lang="en-US"/>
@@ -180,7 +181,7 @@
         <p:spPr>
           <a:xfrm>
             <a:off x="0" y="0"/>
-            <a:ext cx="2971800" cy="458788"/>
+            <a:ext cx="2945659" cy="495348"/>
           </a:xfrm>
           <a:prstGeom prst="rect">
             <a:avLst/>
@@ -216,8 +217,8 @@
         </p:nvSpPr>
         <p:spPr>
           <a:xfrm>
-            <a:off x="3884613" y="0"/>
-            <a:ext cx="2971800" cy="458788"/>
+            <a:off x="3850443" y="0"/>
+            <a:ext cx="2945659" cy="495348"/>
           </a:xfrm>
           <a:prstGeom prst="rect">
             <a:avLst/>
@@ -233,7 +234,7 @@
           <a:p>
             <a:fld id="{0AAE6376-87C4-4D16-82D1-D37904F930BA}" type="datetimeFigureOut">
               <a:rPr lang="en-NL" smtClean="0"/>
-              <a:t>01/06/2020</a:t>
+              <a:t>08/06/2020</a:t>
             </a:fld>
             <a:endParaRPr lang="en-NL"/>
           </a:p>
@@ -257,8 +258,8 @@
         </p:nvSpPr>
         <p:spPr>
           <a:xfrm>
-            <a:off x="0" y="8685213"/>
-            <a:ext cx="2971800" cy="458787"/>
+            <a:off x="0" y="9377317"/>
+            <a:ext cx="2945659" cy="495347"/>
           </a:xfrm>
           <a:prstGeom prst="rect">
             <a:avLst/>
@@ -294,8 +295,8 @@
         </p:nvSpPr>
         <p:spPr>
           <a:xfrm>
-            <a:off x="3884613" y="8685213"/>
-            <a:ext cx="2971800" cy="458787"/>
+            <a:off x="3850443" y="9377317"/>
+            <a:ext cx="2945659" cy="495347"/>
           </a:xfrm>
           <a:prstGeom prst="rect">
             <a:avLst/>
@@ -363,7 +364,7 @@
         <p:spPr>
           <a:xfrm>
             <a:off x="0" y="0"/>
-            <a:ext cx="2971800" cy="458788"/>
+            <a:ext cx="2945659" cy="495348"/>
           </a:xfrm>
           <a:prstGeom prst="rect">
             <a:avLst/>
@@ -393,8 +394,8 @@
         </p:nvSpPr>
         <p:spPr>
           <a:xfrm>
-            <a:off x="3884613" y="0"/>
-            <a:ext cx="2971800" cy="458788"/>
+            <a:off x="3850443" y="0"/>
+            <a:ext cx="2945659" cy="495348"/>
           </a:xfrm>
           <a:prstGeom prst="rect">
             <a:avLst/>
@@ -410,7 +411,7 @@
           <a:p>
             <a:fld id="{3FA52A83-AFF0-44B5-B0CB-BF1EF92BF110}" type="datetimeFigureOut">
               <a:rPr lang="en-NL" smtClean="0"/>
-              <a:t>01/06/2020</a:t>
+              <a:t>08/06/2020</a:t>
             </a:fld>
             <a:endParaRPr lang="en-NL"/>
           </a:p>
@@ -428,8 +429,8 @@
         </p:nvSpPr>
         <p:spPr>
           <a:xfrm>
-            <a:off x="685800" y="1143000"/>
-            <a:ext cx="5486400" cy="3086100"/>
+            <a:off x="438150" y="1233488"/>
+            <a:ext cx="5921375" cy="3332162"/>
           </a:xfrm>
           <a:prstGeom prst="rect">
             <a:avLst/>
@@ -461,8 +462,8 @@
         </p:nvSpPr>
         <p:spPr>
           <a:xfrm>
-            <a:off x="685800" y="4400550"/>
-            <a:ext cx="5486400" cy="3600450"/>
+            <a:off x="679768" y="4751219"/>
+            <a:ext cx="5438140" cy="3887361"/>
           </a:xfrm>
           <a:prstGeom prst="rect">
             <a:avLst/>
@@ -521,8 +522,8 @@
         </p:nvSpPr>
         <p:spPr>
           <a:xfrm>
-            <a:off x="0" y="8685213"/>
-            <a:ext cx="2971800" cy="458787"/>
+            <a:off x="0" y="9377317"/>
+            <a:ext cx="2945659" cy="495347"/>
           </a:xfrm>
           <a:prstGeom prst="rect">
             <a:avLst/>
@@ -552,8 +553,8 @@
         </p:nvSpPr>
         <p:spPr>
           <a:xfrm>
-            <a:off x="3884613" y="8685213"/>
-            <a:ext cx="2971800" cy="458787"/>
+            <a:off x="3850443" y="9377317"/>
+            <a:ext cx="2945659" cy="495347"/>
           </a:xfrm>
           <a:prstGeom prst="rect">
             <a:avLst/>
@@ -1014,6 +1015,90 @@
 </p:notes>
 </file>
 
+<file path=ppt/notesSlides/notesSlide5.xml><?xml version="1.0" encoding="utf-8"?>
+<p:notes xmlns:a="http://schemas.openxmlformats.org/drawingml/2006/main" xmlns:r="http://schemas.openxmlformats.org/officeDocument/2006/relationships" xmlns:p="http://schemas.openxmlformats.org/presentationml/2006/main">
+  <p:cSld>
+    <p:spTree>
+      <p:nvGrpSpPr>
+        <p:cNvPr id="1" name=""/>
+        <p:cNvGrpSpPr/>
+        <p:nvPr/>
+      </p:nvGrpSpPr>
+      <p:grpSpPr>
+        <a:xfrm>
+          <a:off x="0" y="0"/>
+          <a:ext cx="0" cy="0"/>
+          <a:chOff x="0" y="0"/>
+          <a:chExt cx="0" cy="0"/>
+        </a:xfrm>
+      </p:grpSpPr>
+      <p:sp>
+        <p:nvSpPr>
+          <p:cNvPr id="2" name="Slide Image Placeholder 1"/>
+          <p:cNvSpPr>
+            <a:spLocks noGrp="1" noRot="1" noChangeAspect="1"/>
+          </p:cNvSpPr>
+          <p:nvPr>
+            <p:ph type="sldImg"/>
+          </p:nvPr>
+        </p:nvSpPr>
+        <p:spPr/>
+      </p:sp>
+      <p:sp>
+        <p:nvSpPr>
+          <p:cNvPr id="3" name="Notes Placeholder 2"/>
+          <p:cNvSpPr>
+            <a:spLocks noGrp="1"/>
+          </p:cNvSpPr>
+          <p:nvPr>
+            <p:ph type="body" idx="1"/>
+          </p:nvPr>
+        </p:nvSpPr>
+        <p:spPr/>
+        <p:txBody>
+          <a:bodyPr/>
+          <a:lstStyle/>
+          <a:p>
+            <a:endParaRPr lang="en-NL" dirty="0"/>
+          </a:p>
+        </p:txBody>
+      </p:sp>
+      <p:sp>
+        <p:nvSpPr>
+          <p:cNvPr id="4" name="Slide Number Placeholder 3"/>
+          <p:cNvSpPr>
+            <a:spLocks noGrp="1"/>
+          </p:cNvSpPr>
+          <p:nvPr>
+            <p:ph type="sldNum" sz="quarter" idx="5"/>
+          </p:nvPr>
+        </p:nvSpPr>
+        <p:spPr/>
+        <p:txBody>
+          <a:bodyPr/>
+          <a:lstStyle/>
+          <a:p>
+            <a:fld id="{210C85D1-D769-4E3C-BD67-6FCFE11EFBEA}" type="slidenum">
+              <a:rPr lang="en-NL" smtClean="0"/>
+              <a:t>17</a:t>
+            </a:fld>
+            <a:endParaRPr lang="en-NL"/>
+          </a:p>
+        </p:txBody>
+      </p:sp>
+    </p:spTree>
+    <p:extLst>
+      <p:ext uri="{BB962C8B-B14F-4D97-AF65-F5344CB8AC3E}">
+        <p14:creationId xmlns:p14="http://schemas.microsoft.com/office/powerpoint/2010/main" val="515885251"/>
+      </p:ext>
+    </p:extLst>
+  </p:cSld>
+  <p:clrMapOvr>
+    <a:masterClrMapping/>
+  </p:clrMapOvr>
+</p:notes>
+</file>
+
 <file path=ppt/slideLayouts/slideLayout1.xml><?xml version="1.0" encoding="utf-8"?>
 <p:sldLayout xmlns:a="http://schemas.openxmlformats.org/drawingml/2006/main" xmlns:r="http://schemas.openxmlformats.org/officeDocument/2006/relationships" xmlns:p="http://schemas.openxmlformats.org/presentationml/2006/main" type="title" preserve="1">
   <p:cSld name="Titeldia">
@@ -1163,7 +1248,7 @@
           <a:p>
             <a:fld id="{9446F294-FC6D-4658-8D72-6C175CC4BEDF}" type="datetimeFigureOut">
               <a:rPr lang="en-US" smtClean="0"/>
-              <a:t>6/1/2020</a:t>
+              <a:t>6/8/2020</a:t>
             </a:fld>
             <a:endParaRPr lang="en-US"/>
           </a:p>
@@ -1363,7 +1448,7 @@
           <a:p>
             <a:fld id="{9446F294-FC6D-4658-8D72-6C175CC4BEDF}" type="datetimeFigureOut">
               <a:rPr lang="en-US" smtClean="0"/>
-              <a:t>6/1/2020</a:t>
+              <a:t>6/8/2020</a:t>
             </a:fld>
             <a:endParaRPr lang="en-US"/>
           </a:p>
@@ -1573,7 +1658,7 @@
           <a:p>
             <a:fld id="{9446F294-FC6D-4658-8D72-6C175CC4BEDF}" type="datetimeFigureOut">
               <a:rPr lang="en-US" smtClean="0"/>
-              <a:t>6/1/2020</a:t>
+              <a:t>6/8/2020</a:t>
             </a:fld>
             <a:endParaRPr lang="en-US"/>
           </a:p>
@@ -1773,7 +1858,7 @@
           <a:p>
             <a:fld id="{9446F294-FC6D-4658-8D72-6C175CC4BEDF}" type="datetimeFigureOut">
               <a:rPr lang="en-US" smtClean="0"/>
-              <a:t>6/1/2020</a:t>
+              <a:t>6/8/2020</a:t>
             </a:fld>
             <a:endParaRPr lang="en-US"/>
           </a:p>
@@ -2049,7 +2134,7 @@
           <a:p>
             <a:fld id="{9446F294-FC6D-4658-8D72-6C175CC4BEDF}" type="datetimeFigureOut">
               <a:rPr lang="en-US" smtClean="0"/>
-              <a:t>6/1/2020</a:t>
+              <a:t>6/8/2020</a:t>
             </a:fld>
             <a:endParaRPr lang="en-US"/>
           </a:p>
@@ -2317,7 +2402,7 @@
           <a:p>
             <a:fld id="{9446F294-FC6D-4658-8D72-6C175CC4BEDF}" type="datetimeFigureOut">
               <a:rPr lang="en-US" smtClean="0"/>
-              <a:t>6/1/2020</a:t>
+              <a:t>6/8/2020</a:t>
             </a:fld>
             <a:endParaRPr lang="en-US"/>
           </a:p>
@@ -2732,7 +2817,7 @@
           <a:p>
             <a:fld id="{9446F294-FC6D-4658-8D72-6C175CC4BEDF}" type="datetimeFigureOut">
               <a:rPr lang="en-US" smtClean="0"/>
-              <a:t>6/1/2020</a:t>
+              <a:t>6/8/2020</a:t>
             </a:fld>
             <a:endParaRPr lang="en-US"/>
           </a:p>
@@ -2874,7 +2959,7 @@
           <a:p>
             <a:fld id="{9446F294-FC6D-4658-8D72-6C175CC4BEDF}" type="datetimeFigureOut">
               <a:rPr lang="en-US" smtClean="0"/>
-              <a:t>6/1/2020</a:t>
+              <a:t>6/8/2020</a:t>
             </a:fld>
             <a:endParaRPr lang="en-US"/>
           </a:p>
@@ -2987,7 +3072,7 @@
           <a:p>
             <a:fld id="{9446F294-FC6D-4658-8D72-6C175CC4BEDF}" type="datetimeFigureOut">
               <a:rPr lang="en-US" smtClean="0"/>
-              <a:t>6/1/2020</a:t>
+              <a:t>6/8/2020</a:t>
             </a:fld>
             <a:endParaRPr lang="en-US"/>
           </a:p>
@@ -3300,7 +3385,7 @@
           <a:p>
             <a:fld id="{9446F294-FC6D-4658-8D72-6C175CC4BEDF}" type="datetimeFigureOut">
               <a:rPr lang="en-US" smtClean="0"/>
-              <a:t>6/1/2020</a:t>
+              <a:t>6/8/2020</a:t>
             </a:fld>
             <a:endParaRPr lang="en-US"/>
           </a:p>
@@ -3589,7 +3674,7 @@
           <a:p>
             <a:fld id="{9446F294-FC6D-4658-8D72-6C175CC4BEDF}" type="datetimeFigureOut">
               <a:rPr lang="en-US" smtClean="0"/>
-              <a:t>6/1/2020</a:t>
+              <a:t>6/8/2020</a:t>
             </a:fld>
             <a:endParaRPr lang="en-US"/>
           </a:p>
@@ -3832,7 +3917,7 @@
           <a:p>
             <a:fld id="{9446F294-FC6D-4658-8D72-6C175CC4BEDF}" type="datetimeFigureOut">
               <a:rPr lang="en-US" smtClean="0"/>
-              <a:t>6/1/2020</a:t>
+              <a:t>6/8/2020</a:t>
             </a:fld>
             <a:endParaRPr lang="en-US"/>
           </a:p>
@@ -6704,8 +6789,8 @@
         </p:nvSpPr>
         <p:spPr>
           <a:xfrm>
-            <a:off x="600772" y="1149928"/>
-            <a:ext cx="10304834" cy="646331"/>
+            <a:off x="261080" y="1050901"/>
+            <a:ext cx="11116443" cy="646331"/>
           </a:xfrm>
           <a:prstGeom prst="rect">
             <a:avLst/>
@@ -6731,6 +6816,17 @@
             </a:r>
             <a:r>
               <a:rPr lang="en-US" dirty="0"/>
+              <a:t>, </a:t>
+            </a:r>
+            <a:r>
+              <a:rPr lang="en-US" b="1" dirty="0">
+                <a:latin typeface="Courier New" panose="02070309020205020404" pitchFamily="49" charset="0"/>
+                <a:cs typeface="Courier New" panose="02070309020205020404" pitchFamily="49" charset="0"/>
+              </a:rPr>
+              <a:t>example-3b.xpl</a:t>
+            </a:r>
+            <a:r>
+              <a:rPr lang="en-US" dirty="0"/>
               <a:t> and </a:t>
             </a:r>
             <a:r>
@@ -6738,7 +6834,7 @@
                 <a:latin typeface="Courier New" panose="02070309020205020404" pitchFamily="49" charset="0"/>
                 <a:cs typeface="Courier New" panose="02070309020205020404" pitchFamily="49" charset="0"/>
               </a:rPr>
-              <a:t>example-3b.xpl</a:t>
+              <a:t>example-3c.xpl</a:t>
             </a:r>
           </a:p>
           <a:p>
@@ -7886,7 +7982,7 @@
           <a:p>
             <a:r>
               <a:rPr lang="en-US" b="1" dirty="0"/>
-              <a:t>Only store files marked enabled</a:t>
+              <a:t>Use p:viewport to split the document</a:t>
             </a:r>
             <a:endParaRPr lang="en-NL" b="1" dirty="0"/>
           </a:p>
@@ -7929,7 +8025,7 @@
                 <a:latin typeface="Courier New" panose="02070309020205020404" pitchFamily="49" charset="0"/>
                 <a:cs typeface="Courier New" panose="02070309020205020404" pitchFamily="49" charset="0"/>
               </a:rPr>
-              <a:t>markupuk-2020/101-B/example-3/example-3f.xpl</a:t>
+              <a:t>markupuk-2020/101-B/example-3/example-3e.xpl</a:t>
             </a:r>
           </a:p>
           <a:p>
@@ -8047,10 +8143,10 @@
       </p:sp>
       <p:sp>
         <p:nvSpPr>
-          <p:cNvPr id="22" name="Rechthoek: ezelsoor 17">
-            <a:extLst>
-              <a:ext uri="{FF2B5EF4-FFF2-40B4-BE49-F238E27FC236}">
-                <a16:creationId xmlns:a16="http://schemas.microsoft.com/office/drawing/2014/main" id="{18CDF56F-CA24-40CF-A244-8E7D16CFB44A}"/>
+          <p:cNvPr id="25" name="Rechthoek: ezelsoor 34">
+            <a:extLst>
+              <a:ext uri="{FF2B5EF4-FFF2-40B4-BE49-F238E27FC236}">
+                <a16:creationId xmlns:a16="http://schemas.microsoft.com/office/drawing/2014/main" id="{D8EE1075-2149-41D2-ACAB-7804F143DB65}"/>
               </a:ext>
             </a:extLst>
           </p:cNvPr>
@@ -8059,8 +8155,8 @@
         </p:nvSpPr>
         <p:spPr>
           <a:xfrm>
-            <a:off x="3911126" y="5974396"/>
-            <a:ext cx="1076936" cy="828626"/>
+            <a:off x="7645109" y="1797540"/>
+            <a:ext cx="1147481" cy="873129"/>
           </a:xfrm>
           <a:prstGeom prst="foldedCorner">
             <a:avLst/>
@@ -8099,17 +8195,17 @@
                   <a:schemeClr val="tx1"/>
                 </a:solidFill>
               </a:rPr>
-              <a:t>output1.xml</a:t>
-            </a:r>
-          </a:p>
-        </p:txBody>
-      </p:sp>
-      <p:sp>
-        <p:nvSpPr>
-          <p:cNvPr id="25" name="Rechthoek: ezelsoor 34">
-            <a:extLst>
-              <a:ext uri="{FF2B5EF4-FFF2-40B4-BE49-F238E27FC236}">
-                <a16:creationId xmlns:a16="http://schemas.microsoft.com/office/drawing/2014/main" id="{D8EE1075-2149-41D2-ACAB-7804F143DB65}"/>
+              <a:t>Result document</a:t>
+            </a:r>
+          </a:p>
+        </p:txBody>
+      </p:sp>
+      <p:sp>
+        <p:nvSpPr>
+          <p:cNvPr id="27" name="Pijl: rechts 25">
+            <a:extLst>
+              <a:ext uri="{FF2B5EF4-FFF2-40B4-BE49-F238E27FC236}">
+                <a16:creationId xmlns:a16="http://schemas.microsoft.com/office/drawing/2014/main" id="{9E538ADC-5AA2-491F-A3C8-73B16C9D88ED}"/>
               </a:ext>
             </a:extLst>
           </p:cNvPr>
@@ -8118,8 +8214,331 @@
         </p:nvSpPr>
         <p:spPr>
           <a:xfrm>
-            <a:off x="7645109" y="1797540"/>
-            <a:ext cx="1147481" cy="873129"/>
+            <a:off x="5618189" y="1976144"/>
+            <a:ext cx="1898905" cy="515923"/>
+          </a:xfrm>
+          <a:prstGeom prst="rightArrow">
+            <a:avLst/>
+          </a:prstGeom>
+          <a:solidFill>
+            <a:schemeClr val="accent1">
+              <a:lumMod val="20000"/>
+              <a:lumOff val="80000"/>
+            </a:schemeClr>
+          </a:solidFill>
+        </p:spPr>
+        <p:style>
+          <a:lnRef idx="2">
+            <a:schemeClr val="accent1">
+              <a:shade val="50000"/>
+            </a:schemeClr>
+          </a:lnRef>
+          <a:fillRef idx="1">
+            <a:schemeClr val="accent1"/>
+          </a:fillRef>
+          <a:effectRef idx="0">
+            <a:schemeClr val="accent1"/>
+          </a:effectRef>
+          <a:fontRef idx="minor">
+            <a:schemeClr val="lt1"/>
+          </a:fontRef>
+        </p:style>
+        <p:txBody>
+          <a:bodyPr rot="0" spcFirstLastPara="0" vertOverflow="overflow" horzOverflow="overflow" vert="horz" wrap="square" lIns="91440" tIns="45720" rIns="91440" bIns="45720" numCol="1" spcCol="0" rtlCol="0" fromWordArt="0" anchor="ctr" anchorCtr="0" forceAA="0" compatLnSpc="1">
+            <a:prstTxWarp prst="textNoShape">
+              <a:avLst/>
+            </a:prstTxWarp>
+            <a:noAutofit/>
+          </a:bodyPr>
+          <a:lstStyle/>
+          <a:p>
+            <a:pPr algn="ctr"/>
+            <a:r>
+              <a:rPr lang="en-US" dirty="0">
+                <a:solidFill>
+                  <a:schemeClr val="tx1"/>
+                </a:solidFill>
+              </a:rPr>
+              <a:t>result</a:t>
+            </a:r>
+          </a:p>
+        </p:txBody>
+      </p:sp>
+      <p:sp>
+        <p:nvSpPr>
+          <p:cNvPr id="17" name="Pijl: rechts 2">
+            <a:extLst>
+              <a:ext uri="{FF2B5EF4-FFF2-40B4-BE49-F238E27FC236}">
+                <a16:creationId xmlns:a16="http://schemas.microsoft.com/office/drawing/2014/main" id="{7CD7877E-A028-431E-9CC3-371B5163FC41}"/>
+              </a:ext>
+            </a:extLst>
+          </p:cNvPr>
+          <p:cNvSpPr/>
+          <p:nvPr/>
+        </p:nvSpPr>
+        <p:spPr>
+          <a:xfrm>
+            <a:off x="1207036" y="2051053"/>
+            <a:ext cx="950607" cy="515923"/>
+          </a:xfrm>
+          <a:prstGeom prst="rightArrow">
+            <a:avLst/>
+          </a:prstGeom>
+          <a:solidFill>
+            <a:schemeClr val="accent1">
+              <a:lumMod val="20000"/>
+              <a:lumOff val="80000"/>
+            </a:schemeClr>
+          </a:solidFill>
+        </p:spPr>
+        <p:style>
+          <a:lnRef idx="2">
+            <a:schemeClr val="accent1">
+              <a:shade val="50000"/>
+            </a:schemeClr>
+          </a:lnRef>
+          <a:fillRef idx="1">
+            <a:schemeClr val="accent1"/>
+          </a:fillRef>
+          <a:effectRef idx="0">
+            <a:schemeClr val="accent1"/>
+          </a:effectRef>
+          <a:fontRef idx="minor">
+            <a:schemeClr val="lt1"/>
+          </a:fontRef>
+        </p:style>
+        <p:txBody>
+          <a:bodyPr rot="0" spcFirstLastPara="0" vertOverflow="overflow" horzOverflow="overflow" vert="horz" wrap="square" lIns="91440" tIns="45720" rIns="91440" bIns="45720" numCol="1" spcCol="0" rtlCol="0" fromWordArt="0" anchor="ctr" anchorCtr="0" forceAA="0" compatLnSpc="1">
+            <a:prstTxWarp prst="textNoShape">
+              <a:avLst/>
+            </a:prstTxWarp>
+            <a:noAutofit/>
+          </a:bodyPr>
+          <a:lstStyle/>
+          <a:p>
+            <a:pPr algn="ctr"/>
+            <a:r>
+              <a:rPr lang="en-US" dirty="0">
+                <a:solidFill>
+                  <a:schemeClr val="tx1"/>
+                </a:solidFill>
+              </a:rPr>
+              <a:t>source</a:t>
+            </a:r>
+          </a:p>
+        </p:txBody>
+      </p:sp>
+      <p:sp>
+        <p:nvSpPr>
+          <p:cNvPr id="15" name="Rechthoek: afgeronde hoeken 3">
+            <a:extLst>
+              <a:ext uri="{FF2B5EF4-FFF2-40B4-BE49-F238E27FC236}">
+                <a16:creationId xmlns:a16="http://schemas.microsoft.com/office/drawing/2014/main" id="{7B1A893A-AC89-4452-8197-3B56551C8F5E}"/>
+              </a:ext>
+            </a:extLst>
+          </p:cNvPr>
+          <p:cNvSpPr/>
+          <p:nvPr/>
+        </p:nvSpPr>
+        <p:spPr>
+          <a:xfrm>
+            <a:off x="2831643" y="3429000"/>
+            <a:ext cx="1913389" cy="1080083"/>
+          </a:xfrm>
+          <a:prstGeom prst="roundRect">
+            <a:avLst/>
+          </a:prstGeom>
+        </p:spPr>
+        <p:style>
+          <a:lnRef idx="2">
+            <a:schemeClr val="accent1">
+              <a:shade val="50000"/>
+            </a:schemeClr>
+          </a:lnRef>
+          <a:fillRef idx="1">
+            <a:schemeClr val="accent1"/>
+          </a:fillRef>
+          <a:effectRef idx="0">
+            <a:schemeClr val="accent1"/>
+          </a:effectRef>
+          <a:fontRef idx="minor">
+            <a:schemeClr val="lt1"/>
+          </a:fontRef>
+        </p:style>
+        <p:txBody>
+          <a:bodyPr rtlCol="0" anchor="ctr"/>
+          <a:lstStyle/>
+          <a:p>
+            <a:pPr algn="ctr"/>
+            <a:r>
+              <a:rPr lang="en-US" sz="2000" dirty="0"/>
+              <a:t>Store the &lt;doc&gt; entry </a:t>
+            </a:r>
+          </a:p>
+        </p:txBody>
+      </p:sp>
+      <p:sp>
+        <p:nvSpPr>
+          <p:cNvPr id="4" name="Arrow: Curved Right 3">
+            <a:extLst>
+              <a:ext uri="{FF2B5EF4-FFF2-40B4-BE49-F238E27FC236}">
+                <a16:creationId xmlns:a16="http://schemas.microsoft.com/office/drawing/2014/main" id="{C947C591-C7F9-447F-9B7D-65431849C9BF}"/>
+              </a:ext>
+            </a:extLst>
+          </p:cNvPr>
+          <p:cNvSpPr/>
+          <p:nvPr/>
+        </p:nvSpPr>
+        <p:spPr>
+          <a:xfrm>
+            <a:off x="2157643" y="2951408"/>
+            <a:ext cx="536296" cy="1049204"/>
+          </a:xfrm>
+          <a:prstGeom prst="curvedRightArrow">
+            <a:avLst/>
+          </a:prstGeom>
+        </p:spPr>
+        <p:style>
+          <a:lnRef idx="2">
+            <a:schemeClr val="accent1">
+              <a:shade val="50000"/>
+            </a:schemeClr>
+          </a:lnRef>
+          <a:fillRef idx="1">
+            <a:schemeClr val="accent1"/>
+          </a:fillRef>
+          <a:effectRef idx="0">
+            <a:schemeClr val="accent1"/>
+          </a:effectRef>
+          <a:fontRef idx="minor">
+            <a:schemeClr val="lt1"/>
+          </a:fontRef>
+        </p:style>
+        <p:txBody>
+          <a:bodyPr rtlCol="0" anchor="ctr"/>
+          <a:lstStyle/>
+          <a:p>
+            <a:pPr algn="ctr"/>
+            <a:endParaRPr lang="en-GB">
+              <a:solidFill>
+                <a:schemeClr val="tx1"/>
+              </a:solidFill>
+            </a:endParaRPr>
+          </a:p>
+        </p:txBody>
+      </p:sp>
+      <p:sp>
+        <p:nvSpPr>
+          <p:cNvPr id="18" name="Arrow: Curved Right 17">
+            <a:extLst>
+              <a:ext uri="{FF2B5EF4-FFF2-40B4-BE49-F238E27FC236}">
+                <a16:creationId xmlns:a16="http://schemas.microsoft.com/office/drawing/2014/main" id="{0243E7D1-32B4-48DA-93CE-EDDE1EA2636B}"/>
+              </a:ext>
+            </a:extLst>
+          </p:cNvPr>
+          <p:cNvSpPr/>
+          <p:nvPr/>
+        </p:nvSpPr>
+        <p:spPr>
+          <a:xfrm rot="10800000">
+            <a:off x="4882736" y="2903722"/>
+            <a:ext cx="545762" cy="1512169"/>
+          </a:xfrm>
+          <a:prstGeom prst="curvedRightArrow">
+            <a:avLst/>
+          </a:prstGeom>
+        </p:spPr>
+        <p:style>
+          <a:lnRef idx="2">
+            <a:schemeClr val="accent1">
+              <a:shade val="50000"/>
+            </a:schemeClr>
+          </a:lnRef>
+          <a:fillRef idx="1">
+            <a:schemeClr val="accent1"/>
+          </a:fillRef>
+          <a:effectRef idx="0">
+            <a:schemeClr val="accent1"/>
+          </a:effectRef>
+          <a:fontRef idx="minor">
+            <a:schemeClr val="lt1"/>
+          </a:fontRef>
+        </p:style>
+        <p:txBody>
+          <a:bodyPr rtlCol="0" anchor="ctr"/>
+          <a:lstStyle/>
+          <a:p>
+            <a:pPr algn="ctr"/>
+            <a:endParaRPr lang="en-GB">
+              <a:solidFill>
+                <a:schemeClr val="tx1"/>
+              </a:solidFill>
+            </a:endParaRPr>
+          </a:p>
+        </p:txBody>
+      </p:sp>
+      <p:sp>
+        <p:nvSpPr>
+          <p:cNvPr id="5" name="Arrow: Down 4">
+            <a:extLst>
+              <a:ext uri="{FF2B5EF4-FFF2-40B4-BE49-F238E27FC236}">
+                <a16:creationId xmlns:a16="http://schemas.microsoft.com/office/drawing/2014/main" id="{C2065929-9FA5-4182-82AC-A1400AF5FE73}"/>
+              </a:ext>
+            </a:extLst>
+          </p:cNvPr>
+          <p:cNvSpPr/>
+          <p:nvPr/>
+        </p:nvSpPr>
+        <p:spPr>
+          <a:xfrm>
+            <a:off x="3409273" y="4664565"/>
+            <a:ext cx="350196" cy="577174"/>
+          </a:xfrm>
+          <a:prstGeom prst="downArrow">
+            <a:avLst/>
+          </a:prstGeom>
+        </p:spPr>
+        <p:style>
+          <a:lnRef idx="2">
+            <a:schemeClr val="accent1">
+              <a:shade val="50000"/>
+            </a:schemeClr>
+          </a:lnRef>
+          <a:fillRef idx="1">
+            <a:schemeClr val="accent1"/>
+          </a:fillRef>
+          <a:effectRef idx="0">
+            <a:schemeClr val="accent1"/>
+          </a:effectRef>
+          <a:fontRef idx="minor">
+            <a:schemeClr val="lt1"/>
+          </a:fontRef>
+        </p:style>
+        <p:txBody>
+          <a:bodyPr rtlCol="0" anchor="ctr"/>
+          <a:lstStyle/>
+          <a:p>
+            <a:pPr algn="ctr"/>
+            <a:endParaRPr lang="en-GB"/>
+          </a:p>
+        </p:txBody>
+      </p:sp>
+      <p:sp>
+        <p:nvSpPr>
+          <p:cNvPr id="28" name="Rechthoek: ezelsoor 17">
+            <a:extLst>
+              <a:ext uri="{FF2B5EF4-FFF2-40B4-BE49-F238E27FC236}">
+                <a16:creationId xmlns:a16="http://schemas.microsoft.com/office/drawing/2014/main" id="{F0F98436-10AC-4A66-A4DB-2448FFB65306}"/>
+              </a:ext>
+            </a:extLst>
+          </p:cNvPr>
+          <p:cNvSpPr/>
+          <p:nvPr/>
+        </p:nvSpPr>
+        <p:spPr>
+          <a:xfrm>
+            <a:off x="1385879" y="3322364"/>
+            <a:ext cx="667966" cy="678248"/>
           </a:xfrm>
           <a:prstGeom prst="foldedCorner">
             <a:avLst/>
@@ -8158,17 +8577,17 @@
                   <a:schemeClr val="tx1"/>
                 </a:solidFill>
               </a:rPr>
-              <a:t>Result document</a:t>
-            </a:r>
-          </a:p>
-        </p:txBody>
-      </p:sp>
-      <p:sp>
-        <p:nvSpPr>
-          <p:cNvPr id="27" name="Pijl: rechts 25">
-            <a:extLst>
-              <a:ext uri="{FF2B5EF4-FFF2-40B4-BE49-F238E27FC236}">
-                <a16:creationId xmlns:a16="http://schemas.microsoft.com/office/drawing/2014/main" id="{9E538ADC-5AA2-491F-A3C8-73B16C9D88ED}"/>
+              <a:t>&lt;doc&gt; entry</a:t>
+            </a:r>
+          </a:p>
+        </p:txBody>
+      </p:sp>
+      <p:sp>
+        <p:nvSpPr>
+          <p:cNvPr id="29" name="Rechthoek: ezelsoor 17">
+            <a:extLst>
+              <a:ext uri="{FF2B5EF4-FFF2-40B4-BE49-F238E27FC236}">
+                <a16:creationId xmlns:a16="http://schemas.microsoft.com/office/drawing/2014/main" id="{D203E94D-7111-462F-894B-778C4BDD5F3D}"/>
               </a:ext>
             </a:extLst>
           </p:cNvPr>
@@ -8177,331 +8596,8 @@
         </p:nvSpPr>
         <p:spPr>
           <a:xfrm>
-            <a:off x="5618189" y="1976144"/>
-            <a:ext cx="1898905" cy="515923"/>
-          </a:xfrm>
-          <a:prstGeom prst="rightArrow">
-            <a:avLst/>
-          </a:prstGeom>
-          <a:solidFill>
-            <a:schemeClr val="accent1">
-              <a:lumMod val="20000"/>
-              <a:lumOff val="80000"/>
-            </a:schemeClr>
-          </a:solidFill>
-        </p:spPr>
-        <p:style>
-          <a:lnRef idx="2">
-            <a:schemeClr val="accent1">
-              <a:shade val="50000"/>
-            </a:schemeClr>
-          </a:lnRef>
-          <a:fillRef idx="1">
-            <a:schemeClr val="accent1"/>
-          </a:fillRef>
-          <a:effectRef idx="0">
-            <a:schemeClr val="accent1"/>
-          </a:effectRef>
-          <a:fontRef idx="minor">
-            <a:schemeClr val="lt1"/>
-          </a:fontRef>
-        </p:style>
-        <p:txBody>
-          <a:bodyPr rot="0" spcFirstLastPara="0" vertOverflow="overflow" horzOverflow="overflow" vert="horz" wrap="square" lIns="91440" tIns="45720" rIns="91440" bIns="45720" numCol="1" spcCol="0" rtlCol="0" fromWordArt="0" anchor="ctr" anchorCtr="0" forceAA="0" compatLnSpc="1">
-            <a:prstTxWarp prst="textNoShape">
-              <a:avLst/>
-            </a:prstTxWarp>
-            <a:noAutofit/>
-          </a:bodyPr>
-          <a:lstStyle/>
-          <a:p>
-            <a:pPr algn="ctr"/>
-            <a:r>
-              <a:rPr lang="en-US" dirty="0">
-                <a:solidFill>
-                  <a:schemeClr val="tx1"/>
-                </a:solidFill>
-              </a:rPr>
-              <a:t>result</a:t>
-            </a:r>
-          </a:p>
-        </p:txBody>
-      </p:sp>
-      <p:sp>
-        <p:nvSpPr>
-          <p:cNvPr id="17" name="Pijl: rechts 2">
-            <a:extLst>
-              <a:ext uri="{FF2B5EF4-FFF2-40B4-BE49-F238E27FC236}">
-                <a16:creationId xmlns:a16="http://schemas.microsoft.com/office/drawing/2014/main" id="{7CD7877E-A028-431E-9CC3-371B5163FC41}"/>
-              </a:ext>
-            </a:extLst>
-          </p:cNvPr>
-          <p:cNvSpPr/>
-          <p:nvPr/>
-        </p:nvSpPr>
-        <p:spPr>
-          <a:xfrm>
-            <a:off x="1207036" y="2051053"/>
-            <a:ext cx="950607" cy="515923"/>
-          </a:xfrm>
-          <a:prstGeom prst="rightArrow">
-            <a:avLst/>
-          </a:prstGeom>
-          <a:solidFill>
-            <a:schemeClr val="accent1">
-              <a:lumMod val="20000"/>
-              <a:lumOff val="80000"/>
-            </a:schemeClr>
-          </a:solidFill>
-        </p:spPr>
-        <p:style>
-          <a:lnRef idx="2">
-            <a:schemeClr val="accent1">
-              <a:shade val="50000"/>
-            </a:schemeClr>
-          </a:lnRef>
-          <a:fillRef idx="1">
-            <a:schemeClr val="accent1"/>
-          </a:fillRef>
-          <a:effectRef idx="0">
-            <a:schemeClr val="accent1"/>
-          </a:effectRef>
-          <a:fontRef idx="minor">
-            <a:schemeClr val="lt1"/>
-          </a:fontRef>
-        </p:style>
-        <p:txBody>
-          <a:bodyPr rot="0" spcFirstLastPara="0" vertOverflow="overflow" horzOverflow="overflow" vert="horz" wrap="square" lIns="91440" tIns="45720" rIns="91440" bIns="45720" numCol="1" spcCol="0" rtlCol="0" fromWordArt="0" anchor="ctr" anchorCtr="0" forceAA="0" compatLnSpc="1">
-            <a:prstTxWarp prst="textNoShape">
-              <a:avLst/>
-            </a:prstTxWarp>
-            <a:noAutofit/>
-          </a:bodyPr>
-          <a:lstStyle/>
-          <a:p>
-            <a:pPr algn="ctr"/>
-            <a:r>
-              <a:rPr lang="en-US" dirty="0">
-                <a:solidFill>
-                  <a:schemeClr val="tx1"/>
-                </a:solidFill>
-              </a:rPr>
-              <a:t>source</a:t>
-            </a:r>
-          </a:p>
-        </p:txBody>
-      </p:sp>
-      <p:sp>
-        <p:nvSpPr>
-          <p:cNvPr id="15" name="Rechthoek: afgeronde hoeken 3">
-            <a:extLst>
-              <a:ext uri="{FF2B5EF4-FFF2-40B4-BE49-F238E27FC236}">
-                <a16:creationId xmlns:a16="http://schemas.microsoft.com/office/drawing/2014/main" id="{7B1A893A-AC89-4452-8197-3B56551C8F5E}"/>
-              </a:ext>
-            </a:extLst>
-          </p:cNvPr>
-          <p:cNvSpPr/>
-          <p:nvPr/>
-        </p:nvSpPr>
-        <p:spPr>
-          <a:xfrm>
-            <a:off x="2823691" y="4501690"/>
-            <a:ext cx="1913389" cy="1080083"/>
-          </a:xfrm>
-          <a:prstGeom prst="roundRect">
-            <a:avLst/>
-          </a:prstGeom>
-        </p:spPr>
-        <p:style>
-          <a:lnRef idx="2">
-            <a:schemeClr val="accent1">
-              <a:shade val="50000"/>
-            </a:schemeClr>
-          </a:lnRef>
-          <a:fillRef idx="1">
-            <a:schemeClr val="accent1"/>
-          </a:fillRef>
-          <a:effectRef idx="0">
-            <a:schemeClr val="accent1"/>
-          </a:effectRef>
-          <a:fontRef idx="minor">
-            <a:schemeClr val="lt1"/>
-          </a:fontRef>
-        </p:style>
-        <p:txBody>
-          <a:bodyPr rtlCol="0" anchor="ctr"/>
-          <a:lstStyle/>
-          <a:p>
-            <a:pPr algn="ctr"/>
-            <a:r>
-              <a:rPr lang="en-US" sz="2000" dirty="0"/>
-              <a:t>Store the &lt;doc&gt; entry </a:t>
-            </a:r>
-          </a:p>
-        </p:txBody>
-      </p:sp>
-      <p:sp>
-        <p:nvSpPr>
-          <p:cNvPr id="4" name="Arrow: Curved Right 3">
-            <a:extLst>
-              <a:ext uri="{FF2B5EF4-FFF2-40B4-BE49-F238E27FC236}">
-                <a16:creationId xmlns:a16="http://schemas.microsoft.com/office/drawing/2014/main" id="{C947C591-C7F9-447F-9B7D-65431849C9BF}"/>
-              </a:ext>
-            </a:extLst>
-          </p:cNvPr>
-          <p:cNvSpPr/>
-          <p:nvPr/>
-        </p:nvSpPr>
-        <p:spPr>
-          <a:xfrm>
-            <a:off x="2157643" y="2951408"/>
-            <a:ext cx="536296" cy="1049204"/>
-          </a:xfrm>
-          <a:prstGeom prst="curvedRightArrow">
-            <a:avLst/>
-          </a:prstGeom>
-        </p:spPr>
-        <p:style>
-          <a:lnRef idx="2">
-            <a:schemeClr val="accent1">
-              <a:shade val="50000"/>
-            </a:schemeClr>
-          </a:lnRef>
-          <a:fillRef idx="1">
-            <a:schemeClr val="accent1"/>
-          </a:fillRef>
-          <a:effectRef idx="0">
-            <a:schemeClr val="accent1"/>
-          </a:effectRef>
-          <a:fontRef idx="minor">
-            <a:schemeClr val="lt1"/>
-          </a:fontRef>
-        </p:style>
-        <p:txBody>
-          <a:bodyPr rtlCol="0" anchor="ctr"/>
-          <a:lstStyle/>
-          <a:p>
-            <a:pPr algn="ctr"/>
-            <a:endParaRPr lang="en-GB">
-              <a:solidFill>
-                <a:schemeClr val="tx1"/>
-              </a:solidFill>
-            </a:endParaRPr>
-          </a:p>
-        </p:txBody>
-      </p:sp>
-      <p:sp>
-        <p:nvSpPr>
-          <p:cNvPr id="18" name="Arrow: Curved Right 17">
-            <a:extLst>
-              <a:ext uri="{FF2B5EF4-FFF2-40B4-BE49-F238E27FC236}">
-                <a16:creationId xmlns:a16="http://schemas.microsoft.com/office/drawing/2014/main" id="{0243E7D1-32B4-48DA-93CE-EDDE1EA2636B}"/>
-              </a:ext>
-            </a:extLst>
-          </p:cNvPr>
-          <p:cNvSpPr/>
-          <p:nvPr/>
-        </p:nvSpPr>
-        <p:spPr>
-          <a:xfrm rot="10800000">
-            <a:off x="5538281" y="2951408"/>
-            <a:ext cx="937542" cy="2238967"/>
-          </a:xfrm>
-          <a:prstGeom prst="curvedRightArrow">
-            <a:avLst/>
-          </a:prstGeom>
-        </p:spPr>
-        <p:style>
-          <a:lnRef idx="2">
-            <a:schemeClr val="accent1">
-              <a:shade val="50000"/>
-            </a:schemeClr>
-          </a:lnRef>
-          <a:fillRef idx="1">
-            <a:schemeClr val="accent1"/>
-          </a:fillRef>
-          <a:effectRef idx="0">
-            <a:schemeClr val="accent1"/>
-          </a:effectRef>
-          <a:fontRef idx="minor">
-            <a:schemeClr val="lt1"/>
-          </a:fontRef>
-        </p:style>
-        <p:txBody>
-          <a:bodyPr rtlCol="0" anchor="ctr"/>
-          <a:lstStyle/>
-          <a:p>
-            <a:pPr algn="ctr"/>
-            <a:endParaRPr lang="en-GB">
-              <a:solidFill>
-                <a:schemeClr val="tx1"/>
-              </a:solidFill>
-            </a:endParaRPr>
-          </a:p>
-        </p:txBody>
-      </p:sp>
-      <p:sp>
-        <p:nvSpPr>
-          <p:cNvPr id="5" name="Arrow: Down 4">
-            <a:extLst>
-              <a:ext uri="{FF2B5EF4-FFF2-40B4-BE49-F238E27FC236}">
-                <a16:creationId xmlns:a16="http://schemas.microsoft.com/office/drawing/2014/main" id="{C2065929-9FA5-4182-82AC-A1400AF5FE73}"/>
-              </a:ext>
-            </a:extLst>
-          </p:cNvPr>
-          <p:cNvSpPr/>
-          <p:nvPr/>
-        </p:nvSpPr>
-        <p:spPr>
-          <a:xfrm>
-            <a:off x="3430188" y="5685809"/>
-            <a:ext cx="350196" cy="577174"/>
-          </a:xfrm>
-          <a:prstGeom prst="downArrow">
-            <a:avLst/>
-          </a:prstGeom>
-        </p:spPr>
-        <p:style>
-          <a:lnRef idx="2">
-            <a:schemeClr val="accent1">
-              <a:shade val="50000"/>
-            </a:schemeClr>
-          </a:lnRef>
-          <a:fillRef idx="1">
-            <a:schemeClr val="accent1"/>
-          </a:fillRef>
-          <a:effectRef idx="0">
-            <a:schemeClr val="accent1"/>
-          </a:effectRef>
-          <a:fontRef idx="minor">
-            <a:schemeClr val="lt1"/>
-          </a:fontRef>
-        </p:style>
-        <p:txBody>
-          <a:bodyPr rtlCol="0" anchor="ctr"/>
-          <a:lstStyle/>
-          <a:p>
-            <a:pPr algn="ctr"/>
-            <a:endParaRPr lang="en-GB"/>
-          </a:p>
-        </p:txBody>
-      </p:sp>
-      <p:sp>
-        <p:nvSpPr>
-          <p:cNvPr id="28" name="Rechthoek: ezelsoor 17">
-            <a:extLst>
-              <a:ext uri="{FF2B5EF4-FFF2-40B4-BE49-F238E27FC236}">
-                <a16:creationId xmlns:a16="http://schemas.microsoft.com/office/drawing/2014/main" id="{F0F98436-10AC-4A66-A4DB-2448FFB65306}"/>
-              </a:ext>
-            </a:extLst>
-          </p:cNvPr>
-          <p:cNvSpPr/>
-          <p:nvPr/>
-        </p:nvSpPr>
-        <p:spPr>
-          <a:xfrm>
-            <a:off x="1385879" y="3322364"/>
-            <a:ext cx="667966" cy="678248"/>
+            <a:off x="5684454" y="3227588"/>
+            <a:ext cx="964194" cy="678248"/>
           </a:xfrm>
           <a:prstGeom prst="foldedCorner">
             <a:avLst/>
@@ -8540,17 +8636,89 @@
                   <a:schemeClr val="tx1"/>
                 </a:solidFill>
               </a:rPr>
-              <a:t>&lt;doc&gt; entry</a:t>
-            </a:r>
-          </a:p>
-        </p:txBody>
-      </p:sp>
-      <p:sp>
-        <p:nvSpPr>
-          <p:cNvPr id="29" name="Rechthoek: ezelsoor 17">
-            <a:extLst>
-              <a:ext uri="{FF2B5EF4-FFF2-40B4-BE49-F238E27FC236}">
-                <a16:creationId xmlns:a16="http://schemas.microsoft.com/office/drawing/2014/main" id="{D203E94D-7111-462F-894B-778C4BDD5F3D}"/>
+              <a:t>&lt;</a:t>
+            </a:r>
+            <a:r>
+              <a:rPr lang="en-US" sz="1400" dirty="0" err="1">
+                <a:solidFill>
+                  <a:schemeClr val="tx1"/>
+                </a:solidFill>
+              </a:rPr>
+              <a:t>c:result</a:t>
+            </a:r>
+            <a:r>
+              <a:rPr lang="en-US" sz="1400" dirty="0">
+                <a:solidFill>
+                  <a:schemeClr val="tx1"/>
+                </a:solidFill>
+              </a:rPr>
+              <a:t>&gt;entry</a:t>
+            </a:r>
+          </a:p>
+        </p:txBody>
+      </p:sp>
+      <p:sp>
+        <p:nvSpPr>
+          <p:cNvPr id="3" name="TextBox 2">
+            <a:extLst>
+              <a:ext uri="{FF2B5EF4-FFF2-40B4-BE49-F238E27FC236}">
+                <a16:creationId xmlns:a16="http://schemas.microsoft.com/office/drawing/2014/main" id="{2FBB9D8D-B188-4D0D-9889-B88AA9B30D85}"/>
+              </a:ext>
+            </a:extLst>
+          </p:cNvPr>
+          <p:cNvSpPr txBox="1"/>
+          <p:nvPr/>
+        </p:nvSpPr>
+        <p:spPr>
+          <a:xfrm>
+            <a:off x="5618189" y="3969041"/>
+            <a:ext cx="2188798" cy="615553"/>
+          </a:xfrm>
+          <a:prstGeom prst="rect">
+            <a:avLst/>
+          </a:prstGeom>
+          <a:noFill/>
+        </p:spPr>
+        <p:txBody>
+          <a:bodyPr wrap="square" rtlCol="0">
+            <a:spAutoFit/>
+          </a:bodyPr>
+          <a:lstStyle/>
+          <a:p>
+            <a:r>
+              <a:rPr lang="en-US" sz="1600" b="1" dirty="0">
+                <a:latin typeface="Courier New" panose="02070309020205020404" pitchFamily="49" charset="0"/>
+                <a:cs typeface="Courier New" panose="02070309020205020404" pitchFamily="49" charset="0"/>
+              </a:rPr>
+              <a:t>result-</a:t>
+            </a:r>
+            <a:r>
+              <a:rPr lang="en-US" sz="1600" b="1" dirty="0" err="1">
+                <a:latin typeface="Courier New" panose="02070309020205020404" pitchFamily="49" charset="0"/>
+                <a:cs typeface="Courier New" panose="02070309020205020404" pitchFamily="49" charset="0"/>
+              </a:rPr>
+              <a:t>uri</a:t>
+            </a:r>
+            <a:br>
+              <a:rPr lang="en-US" sz="1600" b="1" dirty="0">
+                <a:latin typeface="Courier New" panose="02070309020205020404" pitchFamily="49" charset="0"/>
+                <a:cs typeface="Courier New" panose="02070309020205020404" pitchFamily="49" charset="0"/>
+              </a:rPr>
+            </a:br>
+            <a:r>
+              <a:rPr lang="en-US" dirty="0"/>
+              <a:t>port</a:t>
+            </a:r>
+            <a:endParaRPr lang="en-GB" dirty="0"/>
+          </a:p>
+        </p:txBody>
+      </p:sp>
+      <p:sp>
+        <p:nvSpPr>
+          <p:cNvPr id="23" name="Rechthoek: ezelsoor 17">
+            <a:extLst>
+              <a:ext uri="{FF2B5EF4-FFF2-40B4-BE49-F238E27FC236}">
+                <a16:creationId xmlns:a16="http://schemas.microsoft.com/office/drawing/2014/main" id="{9901EBB4-F948-42FC-8EDA-EDA0382CA096}"/>
               </a:ext>
             </a:extLst>
           </p:cNvPr>
@@ -8559,8 +8727,8 @@
         </p:nvSpPr>
         <p:spPr>
           <a:xfrm>
-            <a:off x="6680915" y="3790689"/>
-            <a:ext cx="964194" cy="678248"/>
+            <a:off x="3409273" y="5540946"/>
+            <a:ext cx="1076936" cy="828626"/>
           </a:xfrm>
           <a:prstGeom prst="foldedCorner">
             <a:avLst/>
@@ -8599,103 +8767,37 @@
                   <a:schemeClr val="tx1"/>
                 </a:solidFill>
               </a:rPr>
-              <a:t>&lt;</a:t>
-            </a:r>
-            <a:r>
-              <a:rPr lang="en-US" sz="1400" dirty="0" err="1">
-                <a:solidFill>
-                  <a:schemeClr val="tx1"/>
-                </a:solidFill>
-              </a:rPr>
-              <a:t>c:result</a:t>
-            </a:r>
-            <a:r>
-              <a:rPr lang="en-US" sz="1400" dirty="0">
-                <a:solidFill>
-                  <a:schemeClr val="tx1"/>
-                </a:solidFill>
-              </a:rPr>
-              <a:t>&gt;entry</a:t>
-            </a:r>
-          </a:p>
-        </p:txBody>
-      </p:sp>
-      <p:sp>
-        <p:nvSpPr>
-          <p:cNvPr id="3" name="TextBox 2">
-            <a:extLst>
-              <a:ext uri="{FF2B5EF4-FFF2-40B4-BE49-F238E27FC236}">
-                <a16:creationId xmlns:a16="http://schemas.microsoft.com/office/drawing/2014/main" id="{2FBB9D8D-B188-4D0D-9889-B88AA9B30D85}"/>
-              </a:ext>
-            </a:extLst>
-          </p:cNvPr>
-          <p:cNvSpPr txBox="1"/>
+              <a:t>output2.xml</a:t>
+            </a:r>
+          </a:p>
+        </p:txBody>
+      </p:sp>
+      <p:sp>
+        <p:nvSpPr>
+          <p:cNvPr id="26" name="Rechthoek: ezelsoor 17">
+            <a:extLst>
+              <a:ext uri="{FF2B5EF4-FFF2-40B4-BE49-F238E27FC236}">
+                <a16:creationId xmlns:a16="http://schemas.microsoft.com/office/drawing/2014/main" id="{8227AE73-8EE7-414B-818A-9B0E211D06C0}"/>
+              </a:ext>
+            </a:extLst>
+          </p:cNvPr>
+          <p:cNvSpPr/>
           <p:nvPr/>
         </p:nvSpPr>
         <p:spPr>
           <a:xfrm>
-            <a:off x="6475823" y="4551783"/>
-            <a:ext cx="2188798" cy="615553"/>
-          </a:xfrm>
-          <a:prstGeom prst="rect">
+            <a:off x="3227564" y="5397221"/>
+            <a:ext cx="1076936" cy="828626"/>
+          </a:xfrm>
+          <a:prstGeom prst="foldedCorner">
             <a:avLst/>
           </a:prstGeom>
-          <a:noFill/>
-        </p:spPr>
-        <p:txBody>
-          <a:bodyPr wrap="square" rtlCol="0">
-            <a:spAutoFit/>
-          </a:bodyPr>
-          <a:lstStyle/>
-          <a:p>
-            <a:r>
-              <a:rPr lang="en-US" sz="1600" b="1" dirty="0">
-                <a:latin typeface="Courier New" panose="02070309020205020404" pitchFamily="49" charset="0"/>
-                <a:cs typeface="Courier New" panose="02070309020205020404" pitchFamily="49" charset="0"/>
-              </a:rPr>
-              <a:t>result-</a:t>
-            </a:r>
-            <a:r>
-              <a:rPr lang="en-US" sz="1600" b="1" dirty="0" err="1">
-                <a:latin typeface="Courier New" panose="02070309020205020404" pitchFamily="49" charset="0"/>
-                <a:cs typeface="Courier New" panose="02070309020205020404" pitchFamily="49" charset="0"/>
-              </a:rPr>
-              <a:t>uri</a:t>
-            </a:r>
-            <a:br>
-              <a:rPr lang="en-US" sz="1600" b="1" dirty="0">
-                <a:latin typeface="Courier New" panose="02070309020205020404" pitchFamily="49" charset="0"/>
-                <a:cs typeface="Courier New" panose="02070309020205020404" pitchFamily="49" charset="0"/>
-              </a:rPr>
-            </a:br>
-            <a:r>
-              <a:rPr lang="en-US" dirty="0"/>
-              <a:t>port</a:t>
-            </a:r>
-            <a:endParaRPr lang="en-GB" dirty="0"/>
-          </a:p>
-        </p:txBody>
-      </p:sp>
-      <p:sp>
-        <p:nvSpPr>
-          <p:cNvPr id="20" name="Rechthoek: afgeronde hoeken 3">
-            <a:extLst>
-              <a:ext uri="{FF2B5EF4-FFF2-40B4-BE49-F238E27FC236}">
-                <a16:creationId xmlns:a16="http://schemas.microsoft.com/office/drawing/2014/main" id="{3D3184B3-3C23-4BB9-8B7B-76BC58A37CB6}"/>
-              </a:ext>
-            </a:extLst>
-          </p:cNvPr>
-          <p:cNvSpPr/>
-          <p:nvPr/>
-        </p:nvSpPr>
-        <p:spPr>
-          <a:xfrm>
-            <a:off x="2823690" y="3302274"/>
-            <a:ext cx="1913389" cy="1080083"/>
-          </a:xfrm>
-          <a:prstGeom prst="roundRect">
-            <a:avLst/>
-          </a:prstGeom>
+          <a:solidFill>
+            <a:schemeClr val="accent4">
+              <a:lumMod val="40000"/>
+              <a:lumOff val="60000"/>
+            </a:schemeClr>
+          </a:solidFill>
         </p:spPr>
         <p:style>
           <a:lnRef idx="2">
@@ -8719,95 +8821,13 @@
           <a:p>
             <a:pPr algn="ctr"/>
             <a:r>
-              <a:rPr lang="en-US" sz="2000" dirty="0"/>
-              <a:t>@enabled = "true"? </a:t>
-            </a:r>
-          </a:p>
-        </p:txBody>
-      </p:sp>
-      <p:sp>
-        <p:nvSpPr>
-          <p:cNvPr id="24" name="Arrow: Curved Right 23">
-            <a:extLst>
-              <a:ext uri="{FF2B5EF4-FFF2-40B4-BE49-F238E27FC236}">
-                <a16:creationId xmlns:a16="http://schemas.microsoft.com/office/drawing/2014/main" id="{E38B40B0-1491-4626-8FDA-94FFE8884AE9}"/>
-              </a:ext>
-            </a:extLst>
-          </p:cNvPr>
-          <p:cNvSpPr/>
-          <p:nvPr/>
-        </p:nvSpPr>
-        <p:spPr>
-          <a:xfrm rot="10800000">
-            <a:off x="4895453" y="2903722"/>
-            <a:ext cx="484452" cy="1174755"/>
-          </a:xfrm>
-          <a:prstGeom prst="curvedRightArrow">
-            <a:avLst/>
-          </a:prstGeom>
-        </p:spPr>
-        <p:style>
-          <a:lnRef idx="2">
-            <a:schemeClr val="accent1">
-              <a:shade val="50000"/>
-            </a:schemeClr>
-          </a:lnRef>
-          <a:fillRef idx="1">
-            <a:schemeClr val="accent1"/>
-          </a:fillRef>
-          <a:effectRef idx="0">
-            <a:schemeClr val="accent1"/>
-          </a:effectRef>
-          <a:fontRef idx="minor">
-            <a:schemeClr val="lt1"/>
-          </a:fontRef>
-        </p:style>
-        <p:txBody>
-          <a:bodyPr rtlCol="0" anchor="ctr"/>
-          <a:lstStyle/>
-          <a:p>
-            <a:pPr algn="ctr"/>
-            <a:endParaRPr lang="en-GB">
-              <a:solidFill>
-                <a:schemeClr val="tx1"/>
-              </a:solidFill>
-            </a:endParaRPr>
-          </a:p>
-        </p:txBody>
-      </p:sp>
-      <p:sp>
-        <p:nvSpPr>
-          <p:cNvPr id="6" name="TextBox 5">
-            <a:extLst>
-              <a:ext uri="{FF2B5EF4-FFF2-40B4-BE49-F238E27FC236}">
-                <a16:creationId xmlns:a16="http://schemas.microsoft.com/office/drawing/2014/main" id="{129379D0-A7B5-487F-A110-ABB60234BD34}"/>
-              </a:ext>
-            </a:extLst>
-          </p:cNvPr>
-          <p:cNvSpPr txBox="1"/>
-          <p:nvPr/>
-        </p:nvSpPr>
-        <p:spPr>
-          <a:xfrm>
-            <a:off x="4734128" y="4012418"/>
-            <a:ext cx="1225686" cy="523220"/>
-          </a:xfrm>
-          <a:prstGeom prst="rect">
-            <a:avLst/>
-          </a:prstGeom>
-          <a:noFill/>
-        </p:spPr>
-        <p:txBody>
-          <a:bodyPr wrap="square" rtlCol="0">
-            <a:spAutoFit/>
-          </a:bodyPr>
-          <a:lstStyle/>
-          <a:p>
-            <a:r>
-              <a:rPr lang="en-US" sz="1400" dirty="0"/>
-              <a:t>Original &lt;doc&gt; entry</a:t>
-            </a:r>
-            <a:endParaRPr lang="en-GB" sz="1400" dirty="0"/>
+              <a:rPr lang="en-US" sz="1400" dirty="0">
+                <a:solidFill>
+                  <a:schemeClr val="tx1"/>
+                </a:solidFill>
+              </a:rPr>
+              <a:t>output1.xml</a:t>
+            </a:r>
           </a:p>
         </p:txBody>
       </p:sp>
@@ -8846,7 +8866,7 @@
           <p:cNvPr id="2" name="Title 1">
             <a:extLst>
               <a:ext uri="{FF2B5EF4-FFF2-40B4-BE49-F238E27FC236}">
-                <a16:creationId xmlns:a16="http://schemas.microsoft.com/office/drawing/2014/main" id="{E1A291CF-5B52-4363-8617-5B975E8B14C2}"/>
+                <a16:creationId xmlns:a16="http://schemas.microsoft.com/office/drawing/2014/main" id="{4123861A-F328-4BB9-8F10-4F9FB0F7E245}"/>
               </a:ext>
             </a:extLst>
           </p:cNvPr>
@@ -8857,39 +8877,10 @@
             <p:ph type="title"/>
           </p:nvPr>
         </p:nvSpPr>
-        <p:spPr/>
-        <p:txBody>
-          <a:bodyPr/>
-          <a:lstStyle/>
-          <a:p>
-            <a:r>
-              <a:rPr lang="en-US" dirty="0"/>
-              <a:t>Wrap up:</a:t>
-            </a:r>
-            <a:endParaRPr lang="en-GB" dirty="0"/>
-          </a:p>
-        </p:txBody>
-      </p:sp>
-      <p:sp>
-        <p:nvSpPr>
-          <p:cNvPr id="3" name="Content Placeholder 2">
-            <a:extLst>
-              <a:ext uri="{FF2B5EF4-FFF2-40B4-BE49-F238E27FC236}">
-                <a16:creationId xmlns:a16="http://schemas.microsoft.com/office/drawing/2014/main" id="{376FB710-45A2-488E-80EE-BFEC0D4BFA7B}"/>
-              </a:ext>
-            </a:extLst>
-          </p:cNvPr>
-          <p:cNvSpPr>
-            <a:spLocks noGrp="1"/>
-          </p:cNvSpPr>
-          <p:nvPr>
-            <p:ph idx="1"/>
-          </p:nvPr>
-        </p:nvSpPr>
-        <p:spPr>
-          <a:xfrm>
-            <a:off x="838200" y="1485089"/>
-            <a:ext cx="10515600" cy="4691874"/>
+        <p:spPr>
+          <a:xfrm>
+            <a:off x="150834" y="216164"/>
+            <a:ext cx="11617960" cy="860848"/>
           </a:xfrm>
         </p:spPr>
         <p:txBody>
@@ -8899,110 +8890,936 @@
           <a:lstStyle/>
           <a:p>
             <a:r>
+              <a:rPr lang="en-US" b="1" dirty="0"/>
+              <a:t>Only store files marked enabled</a:t>
+            </a:r>
+            <a:endParaRPr lang="en-NL" b="1" dirty="0"/>
+          </a:p>
+        </p:txBody>
+      </p:sp>
+      <p:sp>
+        <p:nvSpPr>
+          <p:cNvPr id="21" name="TextBox 20">
+            <a:extLst>
+              <a:ext uri="{FF2B5EF4-FFF2-40B4-BE49-F238E27FC236}">
+                <a16:creationId xmlns:a16="http://schemas.microsoft.com/office/drawing/2014/main" id="{60A84986-2B16-4899-B72A-B7BD622672FF}"/>
+              </a:ext>
+            </a:extLst>
+          </p:cNvPr>
+          <p:cNvSpPr txBox="1"/>
+          <p:nvPr/>
+        </p:nvSpPr>
+        <p:spPr>
+          <a:xfrm>
+            <a:off x="736958" y="1084642"/>
+            <a:ext cx="10304834" cy="646331"/>
+          </a:xfrm>
+          <a:prstGeom prst="rect">
+            <a:avLst/>
+          </a:prstGeom>
+          <a:noFill/>
+        </p:spPr>
+        <p:txBody>
+          <a:bodyPr wrap="square" rtlCol="0">
+            <a:spAutoFit/>
+          </a:bodyPr>
+          <a:lstStyle/>
+          <a:p>
+            <a:r>
               <a:rPr lang="en-US" dirty="0"/>
-              <a:t>You can set options by attribute or using </a:t>
-            </a:r>
-            <a:r>
-              <a:rPr lang="en-US" sz="2400" b="1" dirty="0">
-                <a:latin typeface="Courier New" panose="02070309020205020404" pitchFamily="49" charset="0"/>
-                <a:cs typeface="Courier New" panose="02070309020205020404" pitchFamily="49" charset="0"/>
+              <a:t>See: </a:t>
+            </a:r>
+            <a:r>
+              <a:rPr lang="en-US" b="1" dirty="0">
+                <a:latin typeface="Courier New" panose="02070309020205020404" pitchFamily="49" charset="0"/>
+                <a:cs typeface="Courier New" panose="02070309020205020404" pitchFamily="49" charset="0"/>
+              </a:rPr>
+              <a:t>markupuk-2020/101-B/example-3/example-3f.xpl</a:t>
+            </a:r>
+          </a:p>
+          <a:p>
+            <a:endParaRPr lang="en-GB" dirty="0"/>
+          </a:p>
+        </p:txBody>
+      </p:sp>
+      <p:sp>
+        <p:nvSpPr>
+          <p:cNvPr id="16" name="Rechthoek: afgeronde hoeken 3">
+            <a:extLst>
+              <a:ext uri="{FF2B5EF4-FFF2-40B4-BE49-F238E27FC236}">
+                <a16:creationId xmlns:a16="http://schemas.microsoft.com/office/drawing/2014/main" id="{59A5AC1A-BD11-43BA-BC90-C8107F1E968E}"/>
+              </a:ext>
+            </a:extLst>
+          </p:cNvPr>
+          <p:cNvSpPr/>
+          <p:nvPr/>
+        </p:nvSpPr>
+        <p:spPr>
+          <a:xfrm>
+            <a:off x="2283972" y="1777306"/>
+            <a:ext cx="3254309" cy="1080083"/>
+          </a:xfrm>
+          <a:prstGeom prst="roundRect">
+            <a:avLst/>
+          </a:prstGeom>
+        </p:spPr>
+        <p:style>
+          <a:lnRef idx="2">
+            <a:schemeClr val="accent1">
+              <a:shade val="50000"/>
+            </a:schemeClr>
+          </a:lnRef>
+          <a:fillRef idx="1">
+            <a:schemeClr val="accent1"/>
+          </a:fillRef>
+          <a:effectRef idx="0">
+            <a:schemeClr val="accent1"/>
+          </a:effectRef>
+          <a:fontRef idx="minor">
+            <a:schemeClr val="lt1"/>
+          </a:fontRef>
+        </p:style>
+        <p:txBody>
+          <a:bodyPr rtlCol="0" anchor="ctr"/>
+          <a:lstStyle/>
+          <a:p>
+            <a:pPr algn="ctr"/>
+            <a:r>
+              <a:rPr lang="en-US" sz="2000" dirty="0"/>
+              <a:t>Viewport on &lt;doc&gt; entries</a:t>
+            </a:r>
+          </a:p>
+        </p:txBody>
+      </p:sp>
+      <p:sp>
+        <p:nvSpPr>
+          <p:cNvPr id="19" name="Rechthoek: ezelsoor 17">
+            <a:extLst>
+              <a:ext uri="{FF2B5EF4-FFF2-40B4-BE49-F238E27FC236}">
+                <a16:creationId xmlns:a16="http://schemas.microsoft.com/office/drawing/2014/main" id="{3C697AEB-0DA9-4E68-95C7-17273EA9001C}"/>
+              </a:ext>
+            </a:extLst>
+          </p:cNvPr>
+          <p:cNvSpPr/>
+          <p:nvPr/>
+        </p:nvSpPr>
+        <p:spPr>
+          <a:xfrm>
+            <a:off x="198490" y="1926070"/>
+            <a:ext cx="1076936" cy="828626"/>
+          </a:xfrm>
+          <a:prstGeom prst="foldedCorner">
+            <a:avLst/>
+          </a:prstGeom>
+          <a:solidFill>
+            <a:schemeClr val="accent4">
+              <a:lumMod val="40000"/>
+              <a:lumOff val="60000"/>
+            </a:schemeClr>
+          </a:solidFill>
+        </p:spPr>
+        <p:style>
+          <a:lnRef idx="2">
+            <a:schemeClr val="accent1">
+              <a:shade val="50000"/>
+            </a:schemeClr>
+          </a:lnRef>
+          <a:fillRef idx="1">
+            <a:schemeClr val="accent1"/>
+          </a:fillRef>
+          <a:effectRef idx="0">
+            <a:schemeClr val="accent1"/>
+          </a:effectRef>
+          <a:fontRef idx="minor">
+            <a:schemeClr val="lt1"/>
+          </a:fontRef>
+        </p:style>
+        <p:txBody>
+          <a:bodyPr rtlCol="0" anchor="ctr"/>
+          <a:lstStyle/>
+          <a:p>
+            <a:pPr algn="ctr"/>
+            <a:r>
+              <a:rPr lang="en-US" sz="1400" dirty="0">
+                <a:solidFill>
+                  <a:schemeClr val="tx1"/>
+                </a:solidFill>
+              </a:rPr>
+              <a:t>Input document</a:t>
+            </a:r>
+          </a:p>
+        </p:txBody>
+      </p:sp>
+      <p:sp>
+        <p:nvSpPr>
+          <p:cNvPr id="22" name="Rechthoek: ezelsoor 17">
+            <a:extLst>
+              <a:ext uri="{FF2B5EF4-FFF2-40B4-BE49-F238E27FC236}">
+                <a16:creationId xmlns:a16="http://schemas.microsoft.com/office/drawing/2014/main" id="{18CDF56F-CA24-40CF-A244-8E7D16CFB44A}"/>
+              </a:ext>
+            </a:extLst>
+          </p:cNvPr>
+          <p:cNvSpPr/>
+          <p:nvPr/>
+        </p:nvSpPr>
+        <p:spPr>
+          <a:xfrm>
+            <a:off x="3911126" y="5974396"/>
+            <a:ext cx="1076936" cy="828626"/>
+          </a:xfrm>
+          <a:prstGeom prst="foldedCorner">
+            <a:avLst/>
+          </a:prstGeom>
+          <a:solidFill>
+            <a:schemeClr val="accent4">
+              <a:lumMod val="40000"/>
+              <a:lumOff val="60000"/>
+            </a:schemeClr>
+          </a:solidFill>
+        </p:spPr>
+        <p:style>
+          <a:lnRef idx="2">
+            <a:schemeClr val="accent1">
+              <a:shade val="50000"/>
+            </a:schemeClr>
+          </a:lnRef>
+          <a:fillRef idx="1">
+            <a:schemeClr val="accent1"/>
+          </a:fillRef>
+          <a:effectRef idx="0">
+            <a:schemeClr val="accent1"/>
+          </a:effectRef>
+          <a:fontRef idx="minor">
+            <a:schemeClr val="lt1"/>
+          </a:fontRef>
+        </p:style>
+        <p:txBody>
+          <a:bodyPr rtlCol="0" anchor="ctr"/>
+          <a:lstStyle/>
+          <a:p>
+            <a:pPr algn="ctr"/>
+            <a:r>
+              <a:rPr lang="en-US" sz="1400" dirty="0">
+                <a:solidFill>
+                  <a:schemeClr val="tx1"/>
+                </a:solidFill>
+              </a:rPr>
+              <a:t>output1.xml</a:t>
+            </a:r>
+          </a:p>
+        </p:txBody>
+      </p:sp>
+      <p:sp>
+        <p:nvSpPr>
+          <p:cNvPr id="25" name="Rechthoek: ezelsoor 34">
+            <a:extLst>
+              <a:ext uri="{FF2B5EF4-FFF2-40B4-BE49-F238E27FC236}">
+                <a16:creationId xmlns:a16="http://schemas.microsoft.com/office/drawing/2014/main" id="{D8EE1075-2149-41D2-ACAB-7804F143DB65}"/>
+              </a:ext>
+            </a:extLst>
+          </p:cNvPr>
+          <p:cNvSpPr/>
+          <p:nvPr/>
+        </p:nvSpPr>
+        <p:spPr>
+          <a:xfrm>
+            <a:off x="7645109" y="1797540"/>
+            <a:ext cx="1147481" cy="873129"/>
+          </a:xfrm>
+          <a:prstGeom prst="foldedCorner">
+            <a:avLst/>
+          </a:prstGeom>
+          <a:solidFill>
+            <a:schemeClr val="accent4">
+              <a:lumMod val="40000"/>
+              <a:lumOff val="60000"/>
+            </a:schemeClr>
+          </a:solidFill>
+        </p:spPr>
+        <p:style>
+          <a:lnRef idx="2">
+            <a:schemeClr val="accent1">
+              <a:shade val="50000"/>
+            </a:schemeClr>
+          </a:lnRef>
+          <a:fillRef idx="1">
+            <a:schemeClr val="accent1"/>
+          </a:fillRef>
+          <a:effectRef idx="0">
+            <a:schemeClr val="accent1"/>
+          </a:effectRef>
+          <a:fontRef idx="minor">
+            <a:schemeClr val="lt1"/>
+          </a:fontRef>
+        </p:style>
+        <p:txBody>
+          <a:bodyPr rtlCol="0" anchor="ctr"/>
+          <a:lstStyle/>
+          <a:p>
+            <a:pPr algn="ctr"/>
+            <a:r>
+              <a:rPr lang="en-US" sz="1400" dirty="0">
+                <a:solidFill>
+                  <a:schemeClr val="tx1"/>
+                </a:solidFill>
+              </a:rPr>
+              <a:t>Result document</a:t>
+            </a:r>
+          </a:p>
+        </p:txBody>
+      </p:sp>
+      <p:sp>
+        <p:nvSpPr>
+          <p:cNvPr id="27" name="Pijl: rechts 25">
+            <a:extLst>
+              <a:ext uri="{FF2B5EF4-FFF2-40B4-BE49-F238E27FC236}">
+                <a16:creationId xmlns:a16="http://schemas.microsoft.com/office/drawing/2014/main" id="{9E538ADC-5AA2-491F-A3C8-73B16C9D88ED}"/>
+              </a:ext>
+            </a:extLst>
+          </p:cNvPr>
+          <p:cNvSpPr/>
+          <p:nvPr/>
+        </p:nvSpPr>
+        <p:spPr>
+          <a:xfrm>
+            <a:off x="5618189" y="1976144"/>
+            <a:ext cx="1898905" cy="515923"/>
+          </a:xfrm>
+          <a:prstGeom prst="rightArrow">
+            <a:avLst/>
+          </a:prstGeom>
+          <a:solidFill>
+            <a:schemeClr val="accent1">
+              <a:lumMod val="20000"/>
+              <a:lumOff val="80000"/>
+            </a:schemeClr>
+          </a:solidFill>
+        </p:spPr>
+        <p:style>
+          <a:lnRef idx="2">
+            <a:schemeClr val="accent1">
+              <a:shade val="50000"/>
+            </a:schemeClr>
+          </a:lnRef>
+          <a:fillRef idx="1">
+            <a:schemeClr val="accent1"/>
+          </a:fillRef>
+          <a:effectRef idx="0">
+            <a:schemeClr val="accent1"/>
+          </a:effectRef>
+          <a:fontRef idx="minor">
+            <a:schemeClr val="lt1"/>
+          </a:fontRef>
+        </p:style>
+        <p:txBody>
+          <a:bodyPr rot="0" spcFirstLastPara="0" vertOverflow="overflow" horzOverflow="overflow" vert="horz" wrap="square" lIns="91440" tIns="45720" rIns="91440" bIns="45720" numCol="1" spcCol="0" rtlCol="0" fromWordArt="0" anchor="ctr" anchorCtr="0" forceAA="0" compatLnSpc="1">
+            <a:prstTxWarp prst="textNoShape">
+              <a:avLst/>
+            </a:prstTxWarp>
+            <a:noAutofit/>
+          </a:bodyPr>
+          <a:lstStyle/>
+          <a:p>
+            <a:pPr algn="ctr"/>
+            <a:r>
+              <a:rPr lang="en-US" dirty="0">
+                <a:solidFill>
+                  <a:schemeClr val="tx1"/>
+                </a:solidFill>
+              </a:rPr>
+              <a:t>result</a:t>
+            </a:r>
+          </a:p>
+        </p:txBody>
+      </p:sp>
+      <p:sp>
+        <p:nvSpPr>
+          <p:cNvPr id="17" name="Pijl: rechts 2">
+            <a:extLst>
+              <a:ext uri="{FF2B5EF4-FFF2-40B4-BE49-F238E27FC236}">
+                <a16:creationId xmlns:a16="http://schemas.microsoft.com/office/drawing/2014/main" id="{7CD7877E-A028-431E-9CC3-371B5163FC41}"/>
+              </a:ext>
+            </a:extLst>
+          </p:cNvPr>
+          <p:cNvSpPr/>
+          <p:nvPr/>
+        </p:nvSpPr>
+        <p:spPr>
+          <a:xfrm>
+            <a:off x="1207036" y="2051053"/>
+            <a:ext cx="950607" cy="515923"/>
+          </a:xfrm>
+          <a:prstGeom prst="rightArrow">
+            <a:avLst/>
+          </a:prstGeom>
+          <a:solidFill>
+            <a:schemeClr val="accent1">
+              <a:lumMod val="20000"/>
+              <a:lumOff val="80000"/>
+            </a:schemeClr>
+          </a:solidFill>
+        </p:spPr>
+        <p:style>
+          <a:lnRef idx="2">
+            <a:schemeClr val="accent1">
+              <a:shade val="50000"/>
+            </a:schemeClr>
+          </a:lnRef>
+          <a:fillRef idx="1">
+            <a:schemeClr val="accent1"/>
+          </a:fillRef>
+          <a:effectRef idx="0">
+            <a:schemeClr val="accent1"/>
+          </a:effectRef>
+          <a:fontRef idx="minor">
+            <a:schemeClr val="lt1"/>
+          </a:fontRef>
+        </p:style>
+        <p:txBody>
+          <a:bodyPr rot="0" spcFirstLastPara="0" vertOverflow="overflow" horzOverflow="overflow" vert="horz" wrap="square" lIns="91440" tIns="45720" rIns="91440" bIns="45720" numCol="1" spcCol="0" rtlCol="0" fromWordArt="0" anchor="ctr" anchorCtr="0" forceAA="0" compatLnSpc="1">
+            <a:prstTxWarp prst="textNoShape">
+              <a:avLst/>
+            </a:prstTxWarp>
+            <a:noAutofit/>
+          </a:bodyPr>
+          <a:lstStyle/>
+          <a:p>
+            <a:pPr algn="ctr"/>
+            <a:r>
+              <a:rPr lang="en-US" dirty="0">
+                <a:solidFill>
+                  <a:schemeClr val="tx1"/>
+                </a:solidFill>
+              </a:rPr>
+              <a:t>source</a:t>
+            </a:r>
+          </a:p>
+        </p:txBody>
+      </p:sp>
+      <p:sp>
+        <p:nvSpPr>
+          <p:cNvPr id="15" name="Rechthoek: afgeronde hoeken 3">
+            <a:extLst>
+              <a:ext uri="{FF2B5EF4-FFF2-40B4-BE49-F238E27FC236}">
+                <a16:creationId xmlns:a16="http://schemas.microsoft.com/office/drawing/2014/main" id="{7B1A893A-AC89-4452-8197-3B56551C8F5E}"/>
+              </a:ext>
+            </a:extLst>
+          </p:cNvPr>
+          <p:cNvSpPr/>
+          <p:nvPr/>
+        </p:nvSpPr>
+        <p:spPr>
+          <a:xfrm>
+            <a:off x="2823691" y="4501690"/>
+            <a:ext cx="1913389" cy="1080083"/>
+          </a:xfrm>
+          <a:prstGeom prst="roundRect">
+            <a:avLst/>
+          </a:prstGeom>
+        </p:spPr>
+        <p:style>
+          <a:lnRef idx="2">
+            <a:schemeClr val="accent1">
+              <a:shade val="50000"/>
+            </a:schemeClr>
+          </a:lnRef>
+          <a:fillRef idx="1">
+            <a:schemeClr val="accent1"/>
+          </a:fillRef>
+          <a:effectRef idx="0">
+            <a:schemeClr val="accent1"/>
+          </a:effectRef>
+          <a:fontRef idx="minor">
+            <a:schemeClr val="lt1"/>
+          </a:fontRef>
+        </p:style>
+        <p:txBody>
+          <a:bodyPr rtlCol="0" anchor="ctr"/>
+          <a:lstStyle/>
+          <a:p>
+            <a:pPr algn="ctr"/>
+            <a:r>
+              <a:rPr lang="en-US" sz="2000" dirty="0"/>
+              <a:t>Store the &lt;doc&gt; entry </a:t>
+            </a:r>
+          </a:p>
+        </p:txBody>
+      </p:sp>
+      <p:sp>
+        <p:nvSpPr>
+          <p:cNvPr id="4" name="Arrow: Curved Right 3">
+            <a:extLst>
+              <a:ext uri="{FF2B5EF4-FFF2-40B4-BE49-F238E27FC236}">
+                <a16:creationId xmlns:a16="http://schemas.microsoft.com/office/drawing/2014/main" id="{C947C591-C7F9-447F-9B7D-65431849C9BF}"/>
+              </a:ext>
+            </a:extLst>
+          </p:cNvPr>
+          <p:cNvSpPr/>
+          <p:nvPr/>
+        </p:nvSpPr>
+        <p:spPr>
+          <a:xfrm>
+            <a:off x="2157643" y="2951408"/>
+            <a:ext cx="536296" cy="1049204"/>
+          </a:xfrm>
+          <a:prstGeom prst="curvedRightArrow">
+            <a:avLst/>
+          </a:prstGeom>
+        </p:spPr>
+        <p:style>
+          <a:lnRef idx="2">
+            <a:schemeClr val="accent1">
+              <a:shade val="50000"/>
+            </a:schemeClr>
+          </a:lnRef>
+          <a:fillRef idx="1">
+            <a:schemeClr val="accent1"/>
+          </a:fillRef>
+          <a:effectRef idx="0">
+            <a:schemeClr val="accent1"/>
+          </a:effectRef>
+          <a:fontRef idx="minor">
+            <a:schemeClr val="lt1"/>
+          </a:fontRef>
+        </p:style>
+        <p:txBody>
+          <a:bodyPr rtlCol="0" anchor="ctr"/>
+          <a:lstStyle/>
+          <a:p>
+            <a:pPr algn="ctr"/>
+            <a:endParaRPr lang="en-GB">
+              <a:solidFill>
+                <a:schemeClr val="tx1"/>
+              </a:solidFill>
+            </a:endParaRPr>
+          </a:p>
+        </p:txBody>
+      </p:sp>
+      <p:sp>
+        <p:nvSpPr>
+          <p:cNvPr id="18" name="Arrow: Curved Right 17">
+            <a:extLst>
+              <a:ext uri="{FF2B5EF4-FFF2-40B4-BE49-F238E27FC236}">
+                <a16:creationId xmlns:a16="http://schemas.microsoft.com/office/drawing/2014/main" id="{0243E7D1-32B4-48DA-93CE-EDDE1EA2636B}"/>
+              </a:ext>
+            </a:extLst>
+          </p:cNvPr>
+          <p:cNvSpPr/>
+          <p:nvPr/>
+        </p:nvSpPr>
+        <p:spPr>
+          <a:xfrm rot="10800000">
+            <a:off x="5538281" y="2951408"/>
+            <a:ext cx="937542" cy="2238967"/>
+          </a:xfrm>
+          <a:prstGeom prst="curvedRightArrow">
+            <a:avLst/>
+          </a:prstGeom>
+        </p:spPr>
+        <p:style>
+          <a:lnRef idx="2">
+            <a:schemeClr val="accent1">
+              <a:shade val="50000"/>
+            </a:schemeClr>
+          </a:lnRef>
+          <a:fillRef idx="1">
+            <a:schemeClr val="accent1"/>
+          </a:fillRef>
+          <a:effectRef idx="0">
+            <a:schemeClr val="accent1"/>
+          </a:effectRef>
+          <a:fontRef idx="minor">
+            <a:schemeClr val="lt1"/>
+          </a:fontRef>
+        </p:style>
+        <p:txBody>
+          <a:bodyPr rtlCol="0" anchor="ctr"/>
+          <a:lstStyle/>
+          <a:p>
+            <a:pPr algn="ctr"/>
+            <a:endParaRPr lang="en-GB">
+              <a:solidFill>
+                <a:schemeClr val="tx1"/>
+              </a:solidFill>
+            </a:endParaRPr>
+          </a:p>
+        </p:txBody>
+      </p:sp>
+      <p:sp>
+        <p:nvSpPr>
+          <p:cNvPr id="5" name="Arrow: Down 4">
+            <a:extLst>
+              <a:ext uri="{FF2B5EF4-FFF2-40B4-BE49-F238E27FC236}">
+                <a16:creationId xmlns:a16="http://schemas.microsoft.com/office/drawing/2014/main" id="{C2065929-9FA5-4182-82AC-A1400AF5FE73}"/>
+              </a:ext>
+            </a:extLst>
+          </p:cNvPr>
+          <p:cNvSpPr/>
+          <p:nvPr/>
+        </p:nvSpPr>
+        <p:spPr>
+          <a:xfrm>
+            <a:off x="3430188" y="5685809"/>
+            <a:ext cx="350196" cy="577174"/>
+          </a:xfrm>
+          <a:prstGeom prst="downArrow">
+            <a:avLst/>
+          </a:prstGeom>
+        </p:spPr>
+        <p:style>
+          <a:lnRef idx="2">
+            <a:schemeClr val="accent1">
+              <a:shade val="50000"/>
+            </a:schemeClr>
+          </a:lnRef>
+          <a:fillRef idx="1">
+            <a:schemeClr val="accent1"/>
+          </a:fillRef>
+          <a:effectRef idx="0">
+            <a:schemeClr val="accent1"/>
+          </a:effectRef>
+          <a:fontRef idx="minor">
+            <a:schemeClr val="lt1"/>
+          </a:fontRef>
+        </p:style>
+        <p:txBody>
+          <a:bodyPr rtlCol="0" anchor="ctr"/>
+          <a:lstStyle/>
+          <a:p>
+            <a:pPr algn="ctr"/>
+            <a:endParaRPr lang="en-GB"/>
+          </a:p>
+        </p:txBody>
+      </p:sp>
+      <p:sp>
+        <p:nvSpPr>
+          <p:cNvPr id="28" name="Rechthoek: ezelsoor 17">
+            <a:extLst>
+              <a:ext uri="{FF2B5EF4-FFF2-40B4-BE49-F238E27FC236}">
+                <a16:creationId xmlns:a16="http://schemas.microsoft.com/office/drawing/2014/main" id="{F0F98436-10AC-4A66-A4DB-2448FFB65306}"/>
+              </a:ext>
+            </a:extLst>
+          </p:cNvPr>
+          <p:cNvSpPr/>
+          <p:nvPr/>
+        </p:nvSpPr>
+        <p:spPr>
+          <a:xfrm>
+            <a:off x="1385879" y="3322364"/>
+            <a:ext cx="667966" cy="678248"/>
+          </a:xfrm>
+          <a:prstGeom prst="foldedCorner">
+            <a:avLst/>
+          </a:prstGeom>
+          <a:solidFill>
+            <a:schemeClr val="accent4">
+              <a:lumMod val="40000"/>
+              <a:lumOff val="60000"/>
+            </a:schemeClr>
+          </a:solidFill>
+        </p:spPr>
+        <p:style>
+          <a:lnRef idx="2">
+            <a:schemeClr val="accent1">
+              <a:shade val="50000"/>
+            </a:schemeClr>
+          </a:lnRef>
+          <a:fillRef idx="1">
+            <a:schemeClr val="accent1"/>
+          </a:fillRef>
+          <a:effectRef idx="0">
+            <a:schemeClr val="accent1"/>
+          </a:effectRef>
+          <a:fontRef idx="minor">
+            <a:schemeClr val="lt1"/>
+          </a:fontRef>
+        </p:style>
+        <p:txBody>
+          <a:bodyPr rtlCol="0" anchor="ctr"/>
+          <a:lstStyle/>
+          <a:p>
+            <a:pPr algn="ctr"/>
+            <a:r>
+              <a:rPr lang="en-US" sz="1400" dirty="0">
+                <a:solidFill>
+                  <a:schemeClr val="tx1"/>
+                </a:solidFill>
+              </a:rPr>
+              <a:t>&lt;doc&gt; entry</a:t>
+            </a:r>
+          </a:p>
+        </p:txBody>
+      </p:sp>
+      <p:sp>
+        <p:nvSpPr>
+          <p:cNvPr id="29" name="Rechthoek: ezelsoor 17">
+            <a:extLst>
+              <a:ext uri="{FF2B5EF4-FFF2-40B4-BE49-F238E27FC236}">
+                <a16:creationId xmlns:a16="http://schemas.microsoft.com/office/drawing/2014/main" id="{D203E94D-7111-462F-894B-778C4BDD5F3D}"/>
+              </a:ext>
+            </a:extLst>
+          </p:cNvPr>
+          <p:cNvSpPr/>
+          <p:nvPr/>
+        </p:nvSpPr>
+        <p:spPr>
+          <a:xfrm>
+            <a:off x="6680915" y="3790689"/>
+            <a:ext cx="964194" cy="678248"/>
+          </a:xfrm>
+          <a:prstGeom prst="foldedCorner">
+            <a:avLst/>
+          </a:prstGeom>
+          <a:solidFill>
+            <a:schemeClr val="accent4">
+              <a:lumMod val="40000"/>
+              <a:lumOff val="60000"/>
+            </a:schemeClr>
+          </a:solidFill>
+        </p:spPr>
+        <p:style>
+          <a:lnRef idx="2">
+            <a:schemeClr val="accent1">
+              <a:shade val="50000"/>
+            </a:schemeClr>
+          </a:lnRef>
+          <a:fillRef idx="1">
+            <a:schemeClr val="accent1"/>
+          </a:fillRef>
+          <a:effectRef idx="0">
+            <a:schemeClr val="accent1"/>
+          </a:effectRef>
+          <a:fontRef idx="minor">
+            <a:schemeClr val="lt1"/>
+          </a:fontRef>
+        </p:style>
+        <p:txBody>
+          <a:bodyPr rtlCol="0" anchor="ctr"/>
+          <a:lstStyle/>
+          <a:p>
+            <a:pPr algn="ctr"/>
+            <a:r>
+              <a:rPr lang="en-US" sz="1400" dirty="0">
+                <a:solidFill>
+                  <a:schemeClr val="tx1"/>
+                </a:solidFill>
               </a:rPr>
               <a:t>&lt;</a:t>
             </a:r>
             <a:r>
-              <a:rPr lang="en-US" sz="2400" b="1" dirty="0" err="1">
-                <a:latin typeface="Courier New" panose="02070309020205020404" pitchFamily="49" charset="0"/>
-                <a:cs typeface="Courier New" panose="02070309020205020404" pitchFamily="49" charset="0"/>
-              </a:rPr>
-              <a:t>p:with-option</a:t>
-            </a:r>
-            <a:r>
-              <a:rPr lang="en-US" sz="2400" b="1" dirty="0">
-                <a:latin typeface="Courier New" panose="02070309020205020404" pitchFamily="49" charset="0"/>
-                <a:cs typeface="Courier New" panose="02070309020205020404" pitchFamily="49" charset="0"/>
-              </a:rPr>
-              <a:t>&gt;</a:t>
-            </a:r>
-            <a:endParaRPr lang="en-US" b="1" dirty="0">
-              <a:latin typeface="Courier New" panose="02070309020205020404" pitchFamily="49" charset="0"/>
-              <a:cs typeface="Courier New" panose="02070309020205020404" pitchFamily="49" charset="0"/>
+              <a:rPr lang="en-US" sz="1400" dirty="0" err="1">
+                <a:solidFill>
+                  <a:schemeClr val="tx1"/>
+                </a:solidFill>
+              </a:rPr>
+              <a:t>c:result</a:t>
+            </a:r>
+            <a:r>
+              <a:rPr lang="en-US" sz="1400" dirty="0">
+                <a:solidFill>
+                  <a:schemeClr val="tx1"/>
+                </a:solidFill>
+              </a:rPr>
+              <a:t>&gt;entry</a:t>
+            </a:r>
+          </a:p>
+        </p:txBody>
+      </p:sp>
+      <p:sp>
+        <p:nvSpPr>
+          <p:cNvPr id="3" name="TextBox 2">
+            <a:extLst>
+              <a:ext uri="{FF2B5EF4-FFF2-40B4-BE49-F238E27FC236}">
+                <a16:creationId xmlns:a16="http://schemas.microsoft.com/office/drawing/2014/main" id="{2FBB9D8D-B188-4D0D-9889-B88AA9B30D85}"/>
+              </a:ext>
+            </a:extLst>
+          </p:cNvPr>
+          <p:cNvSpPr txBox="1"/>
+          <p:nvPr/>
+        </p:nvSpPr>
+        <p:spPr>
+          <a:xfrm>
+            <a:off x="6475823" y="4551783"/>
+            <a:ext cx="2188798" cy="615553"/>
+          </a:xfrm>
+          <a:prstGeom prst="rect">
+            <a:avLst/>
+          </a:prstGeom>
+          <a:noFill/>
+        </p:spPr>
+        <p:txBody>
+          <a:bodyPr wrap="square" rtlCol="0">
+            <a:spAutoFit/>
+          </a:bodyPr>
+          <a:lstStyle/>
+          <a:p>
+            <a:r>
+              <a:rPr lang="en-US" sz="1600" b="1" dirty="0">
+                <a:latin typeface="Courier New" panose="02070309020205020404" pitchFamily="49" charset="0"/>
+                <a:cs typeface="Courier New" panose="02070309020205020404" pitchFamily="49" charset="0"/>
+              </a:rPr>
+              <a:t>result-</a:t>
+            </a:r>
+            <a:r>
+              <a:rPr lang="en-US" sz="1600" b="1" dirty="0" err="1">
+                <a:latin typeface="Courier New" panose="02070309020205020404" pitchFamily="49" charset="0"/>
+                <a:cs typeface="Courier New" panose="02070309020205020404" pitchFamily="49" charset="0"/>
+              </a:rPr>
+              <a:t>uri</a:t>
+            </a:r>
+            <a:br>
+              <a:rPr lang="en-US" sz="1600" b="1" dirty="0">
+                <a:latin typeface="Courier New" panose="02070309020205020404" pitchFamily="49" charset="0"/>
+                <a:cs typeface="Courier New" panose="02070309020205020404" pitchFamily="49" charset="0"/>
+              </a:rPr>
+            </a:br>
+            <a:r>
+              <a:rPr lang="en-US" dirty="0"/>
+              <a:t>port</a:t>
+            </a:r>
+            <a:endParaRPr lang="en-GB" dirty="0"/>
+          </a:p>
+        </p:txBody>
+      </p:sp>
+      <p:sp>
+        <p:nvSpPr>
+          <p:cNvPr id="20" name="Rechthoek: afgeronde hoeken 3">
+            <a:extLst>
+              <a:ext uri="{FF2B5EF4-FFF2-40B4-BE49-F238E27FC236}">
+                <a16:creationId xmlns:a16="http://schemas.microsoft.com/office/drawing/2014/main" id="{3D3184B3-3C23-4BB9-8B7B-76BC58A37CB6}"/>
+              </a:ext>
+            </a:extLst>
+          </p:cNvPr>
+          <p:cNvSpPr/>
+          <p:nvPr/>
+        </p:nvSpPr>
+        <p:spPr>
+          <a:xfrm>
+            <a:off x="2823690" y="3302274"/>
+            <a:ext cx="1913389" cy="1080083"/>
+          </a:xfrm>
+          <a:prstGeom prst="roundRect">
+            <a:avLst/>
+          </a:prstGeom>
+        </p:spPr>
+        <p:style>
+          <a:lnRef idx="2">
+            <a:schemeClr val="accent1">
+              <a:shade val="50000"/>
+            </a:schemeClr>
+          </a:lnRef>
+          <a:fillRef idx="1">
+            <a:schemeClr val="accent1"/>
+          </a:fillRef>
+          <a:effectRef idx="0">
+            <a:schemeClr val="accent1"/>
+          </a:effectRef>
+          <a:fontRef idx="minor">
+            <a:schemeClr val="lt1"/>
+          </a:fontRef>
+        </p:style>
+        <p:txBody>
+          <a:bodyPr rtlCol="0" anchor="ctr"/>
+          <a:lstStyle/>
+          <a:p>
+            <a:pPr algn="ctr"/>
+            <a:r>
+              <a:rPr lang="en-US" sz="2000" dirty="0"/>
+              <a:t>@enabled = "true"? </a:t>
+            </a:r>
+          </a:p>
+        </p:txBody>
+      </p:sp>
+      <p:sp>
+        <p:nvSpPr>
+          <p:cNvPr id="24" name="Arrow: Curved Right 23">
+            <a:extLst>
+              <a:ext uri="{FF2B5EF4-FFF2-40B4-BE49-F238E27FC236}">
+                <a16:creationId xmlns:a16="http://schemas.microsoft.com/office/drawing/2014/main" id="{E38B40B0-1491-4626-8FDA-94FFE8884AE9}"/>
+              </a:ext>
+            </a:extLst>
+          </p:cNvPr>
+          <p:cNvSpPr/>
+          <p:nvPr/>
+        </p:nvSpPr>
+        <p:spPr>
+          <a:xfrm rot="10800000">
+            <a:off x="4895453" y="2903722"/>
+            <a:ext cx="484452" cy="1174755"/>
+          </a:xfrm>
+          <a:prstGeom prst="curvedRightArrow">
+            <a:avLst/>
+          </a:prstGeom>
+        </p:spPr>
+        <p:style>
+          <a:lnRef idx="2">
+            <a:schemeClr val="accent1">
+              <a:shade val="50000"/>
+            </a:schemeClr>
+          </a:lnRef>
+          <a:fillRef idx="1">
+            <a:schemeClr val="accent1"/>
+          </a:fillRef>
+          <a:effectRef idx="0">
+            <a:schemeClr val="accent1"/>
+          </a:effectRef>
+          <a:fontRef idx="minor">
+            <a:schemeClr val="lt1"/>
+          </a:fontRef>
+        </p:style>
+        <p:txBody>
+          <a:bodyPr rtlCol="0" anchor="ctr"/>
+          <a:lstStyle/>
+          <a:p>
+            <a:pPr algn="ctr"/>
+            <a:endParaRPr lang="en-GB">
+              <a:solidFill>
+                <a:schemeClr val="tx1"/>
+              </a:solidFill>
             </a:endParaRPr>
           </a:p>
-          <a:p>
-            <a:pPr lvl="1"/>
-            <a:r>
-              <a:rPr lang="en-US" dirty="0"/>
-              <a:t>Watch out: Who is going to interpret the XPath expressions?</a:t>
-            </a:r>
-          </a:p>
-          <a:p>
-            <a:r>
-              <a:rPr lang="en-US" dirty="0"/>
-              <a:t>You can define and use variables</a:t>
-            </a:r>
-          </a:p>
-          <a:p>
-            <a:pPr lvl="1"/>
-            <a:r>
-              <a:rPr lang="en-US" dirty="0"/>
-              <a:t>XPath expression do not have to be based on the document flowing through</a:t>
-            </a:r>
-          </a:p>
-          <a:p>
-            <a:r>
-              <a:rPr lang="en-US" dirty="0"/>
-              <a:t>There are core steps for looping, decision making, etc.</a:t>
-            </a:r>
-            <a:br>
-              <a:rPr lang="en-US" dirty="0"/>
-            </a:br>
-            <a:r>
-              <a:rPr lang="en-US" dirty="0"/>
-              <a:t>We looked at:</a:t>
-            </a:r>
-          </a:p>
-          <a:p>
-            <a:pPr lvl="1"/>
-            <a:r>
-              <a:rPr lang="en-US" b="1" dirty="0">
-                <a:latin typeface="Courier New" panose="02070309020205020404" pitchFamily="49" charset="0"/>
-                <a:cs typeface="Courier New" panose="02070309020205020404" pitchFamily="49" charset="0"/>
-              </a:rPr>
-              <a:t>p:for-each</a:t>
-            </a:r>
-          </a:p>
-          <a:p>
-            <a:pPr lvl="1"/>
-            <a:r>
-              <a:rPr lang="en-US" b="1" dirty="0">
-                <a:latin typeface="Courier New" panose="02070309020205020404" pitchFamily="49" charset="0"/>
-                <a:cs typeface="Courier New" panose="02070309020205020404" pitchFamily="49" charset="0"/>
-              </a:rPr>
-              <a:t>p:viewport</a:t>
-            </a:r>
-          </a:p>
-          <a:p>
-            <a:pPr lvl="1"/>
-            <a:r>
-              <a:rPr lang="en-US" b="1" dirty="0">
-                <a:latin typeface="Courier New" panose="02070309020205020404" pitchFamily="49" charset="0"/>
-                <a:cs typeface="Courier New" panose="02070309020205020404" pitchFamily="49" charset="0"/>
-              </a:rPr>
-              <a:t>p:if</a:t>
-            </a:r>
-          </a:p>
-          <a:p>
-            <a:pPr marL="457200" lvl="1" indent="0">
-              <a:buNone/>
-            </a:pPr>
-            <a:endParaRPr lang="en-GB" dirty="0"/>
+        </p:txBody>
+      </p:sp>
+      <p:sp>
+        <p:nvSpPr>
+          <p:cNvPr id="6" name="TextBox 5">
+            <a:extLst>
+              <a:ext uri="{FF2B5EF4-FFF2-40B4-BE49-F238E27FC236}">
+                <a16:creationId xmlns:a16="http://schemas.microsoft.com/office/drawing/2014/main" id="{129379D0-A7B5-487F-A110-ABB60234BD34}"/>
+              </a:ext>
+            </a:extLst>
+          </p:cNvPr>
+          <p:cNvSpPr txBox="1"/>
+          <p:nvPr/>
+        </p:nvSpPr>
+        <p:spPr>
+          <a:xfrm>
+            <a:off x="4734128" y="4012418"/>
+            <a:ext cx="1225686" cy="523220"/>
+          </a:xfrm>
+          <a:prstGeom prst="rect">
+            <a:avLst/>
+          </a:prstGeom>
+          <a:noFill/>
+        </p:spPr>
+        <p:txBody>
+          <a:bodyPr wrap="square" rtlCol="0">
+            <a:spAutoFit/>
+          </a:bodyPr>
+          <a:lstStyle/>
+          <a:p>
+            <a:r>
+              <a:rPr lang="en-US" sz="1400" dirty="0"/>
+              <a:t>Original &lt;doc&gt; entry</a:t>
+            </a:r>
+            <a:endParaRPr lang="en-GB" sz="1400" dirty="0"/>
           </a:p>
         </p:txBody>
       </p:sp>
     </p:spTree>
     <p:extLst>
       <p:ext uri="{BB962C8B-B14F-4D97-AF65-F5344CB8AC3E}">
-        <p14:creationId xmlns:p14="http://schemas.microsoft.com/office/powerpoint/2010/main" val="1043788117"/>
+        <p14:creationId xmlns:p14="http://schemas.microsoft.com/office/powerpoint/2010/main" val="3880199402"/>
       </p:ext>
     </p:extLst>
   </p:cSld>
@@ -9034,7 +9851,7 @@
           <p:cNvPr id="2" name="Title 1">
             <a:extLst>
               <a:ext uri="{FF2B5EF4-FFF2-40B4-BE49-F238E27FC236}">
-                <a16:creationId xmlns:a16="http://schemas.microsoft.com/office/drawing/2014/main" id="{69C1F8C1-9C4C-4D54-8868-98D27E1594F0}"/>
+                <a16:creationId xmlns:a16="http://schemas.microsoft.com/office/drawing/2014/main" id="{E1A291CF-5B52-4363-8617-5B975E8B14C2}"/>
               </a:ext>
             </a:extLst>
           </p:cNvPr>
@@ -9045,21 +9862,16 @@
             <p:ph type="title"/>
           </p:nvPr>
         </p:nvSpPr>
-        <p:spPr>
-          <a:xfrm>
-            <a:off x="199743" y="148699"/>
-            <a:ext cx="10515600" cy="868503"/>
-          </a:xfrm>
-        </p:spPr>
+        <p:spPr/>
         <p:txBody>
           <a:bodyPr/>
           <a:lstStyle/>
           <a:p>
             <a:r>
-              <a:rPr lang="en-US" b="1" dirty="0"/>
-              <a:t>Goodbye and thank the fish, again!</a:t>
-            </a:r>
-            <a:endParaRPr lang="en-NL" b="1" dirty="0"/>
+              <a:rPr lang="en-US" dirty="0"/>
+              <a:t>Wrap up:</a:t>
+            </a:r>
+            <a:endParaRPr lang="en-GB" dirty="0"/>
           </a:p>
         </p:txBody>
       </p:sp>
@@ -9068,7 +9880,7 @@
           <p:cNvPr id="3" name="Content Placeholder 2">
             <a:extLst>
               <a:ext uri="{FF2B5EF4-FFF2-40B4-BE49-F238E27FC236}">
-                <a16:creationId xmlns:a16="http://schemas.microsoft.com/office/drawing/2014/main" id="{EB447546-94E1-423A-8164-617B557A77FC}"/>
+                <a16:creationId xmlns:a16="http://schemas.microsoft.com/office/drawing/2014/main" id="{376FB710-45A2-488E-80EE-BFEC0D4BFA7B}"/>
               </a:ext>
             </a:extLst>
           </p:cNvPr>
@@ -9081,8 +9893,8 @@
         </p:nvSpPr>
         <p:spPr>
           <a:xfrm>
-            <a:off x="713755" y="1253331"/>
-            <a:ext cx="10515600" cy="5093362"/>
+            <a:off x="838200" y="1485089"/>
+            <a:ext cx="10515600" cy="4691874"/>
           </a:xfrm>
         </p:spPr>
         <p:txBody>
@@ -9091,222 +9903,111 @@
           </a:bodyPr>
           <a:lstStyle/>
           <a:p>
-            <a:pPr marL="0" indent="0">
+            <a:r>
+              <a:rPr lang="en-US" dirty="0"/>
+              <a:t>You can set options by attribute or using </a:t>
+            </a:r>
+            <a:r>
+              <a:rPr lang="en-US" sz="2400" b="1" dirty="0">
+                <a:latin typeface="Courier New" panose="02070309020205020404" pitchFamily="49" charset="0"/>
+                <a:cs typeface="Courier New" panose="02070309020205020404" pitchFamily="49" charset="0"/>
+              </a:rPr>
+              <a:t>&lt;</a:t>
+            </a:r>
+            <a:r>
+              <a:rPr lang="en-US" sz="2400" b="1" dirty="0" err="1">
+                <a:latin typeface="Courier New" panose="02070309020205020404" pitchFamily="49" charset="0"/>
+                <a:cs typeface="Courier New" panose="02070309020205020404" pitchFamily="49" charset="0"/>
+              </a:rPr>
+              <a:t>p:with-option</a:t>
+            </a:r>
+            <a:r>
+              <a:rPr lang="en-US" sz="2400" b="1" dirty="0">
+                <a:latin typeface="Courier New" panose="02070309020205020404" pitchFamily="49" charset="0"/>
+                <a:cs typeface="Courier New" panose="02070309020205020404" pitchFamily="49" charset="0"/>
+              </a:rPr>
+              <a:t>&gt;</a:t>
+            </a:r>
+            <a:endParaRPr lang="en-US" b="1" dirty="0">
+              <a:latin typeface="Courier New" panose="02070309020205020404" pitchFamily="49" charset="0"/>
+              <a:cs typeface="Courier New" panose="02070309020205020404" pitchFamily="49" charset="0"/>
+            </a:endParaRPr>
+          </a:p>
+          <a:p>
+            <a:pPr lvl="1"/>
+            <a:r>
+              <a:rPr lang="en-US" dirty="0"/>
+              <a:t>Watch out: Who is going to interpret the XPath expressions?</a:t>
+            </a:r>
+          </a:p>
+          <a:p>
+            <a:r>
+              <a:rPr lang="en-US" dirty="0"/>
+              <a:t>You can define and use variables</a:t>
+            </a:r>
+          </a:p>
+          <a:p>
+            <a:pPr lvl="1"/>
+            <a:r>
+              <a:rPr lang="en-US" dirty="0"/>
+              <a:t>XPath expression do not have to be based on the document flowing through</a:t>
+            </a:r>
+          </a:p>
+          <a:p>
+            <a:r>
+              <a:rPr lang="en-US" dirty="0"/>
+              <a:t>There are core steps for looping, decision making, etc.</a:t>
+            </a:r>
+            <a:br>
+              <a:rPr lang="en-US" dirty="0"/>
+            </a:br>
+            <a:r>
+              <a:rPr lang="en-US" dirty="0"/>
+              <a:t>We looked at:</a:t>
+            </a:r>
+          </a:p>
+          <a:p>
+            <a:pPr lvl="1"/>
+            <a:r>
+              <a:rPr lang="en-US" b="1" dirty="0">
+                <a:latin typeface="Courier New" panose="02070309020205020404" pitchFamily="49" charset="0"/>
+                <a:cs typeface="Courier New" panose="02070309020205020404" pitchFamily="49" charset="0"/>
+              </a:rPr>
+              <a:t>p:for-each</a:t>
+            </a:r>
+          </a:p>
+          <a:p>
+            <a:pPr lvl="1"/>
+            <a:r>
+              <a:rPr lang="en-US" b="1" dirty="0">
+                <a:latin typeface="Courier New" panose="02070309020205020404" pitchFamily="49" charset="0"/>
+                <a:cs typeface="Courier New" panose="02070309020205020404" pitchFamily="49" charset="0"/>
+              </a:rPr>
+              <a:t>p:viewport</a:t>
+            </a:r>
+          </a:p>
+          <a:p>
+            <a:pPr lvl="1"/>
+            <a:r>
+              <a:rPr lang="en-US" b="1" dirty="0">
+                <a:latin typeface="Courier New" panose="02070309020205020404" pitchFamily="49" charset="0"/>
+                <a:cs typeface="Courier New" panose="02070309020205020404" pitchFamily="49" charset="0"/>
+              </a:rPr>
+              <a:t>p:if</a:t>
+            </a:r>
+          </a:p>
+          <a:p>
+            <a:pPr marL="457200" lvl="1" indent="0">
               <a:buNone/>
             </a:pPr>
-            <a:r>
-              <a:rPr lang="nl-NL" dirty="0" err="1"/>
-              <a:t>Your</a:t>
-            </a:r>
-            <a:r>
-              <a:rPr lang="nl-NL" dirty="0"/>
-              <a:t> guide </a:t>
-            </a:r>
-            <a:r>
-              <a:rPr lang="nl-NL" dirty="0" err="1"/>
-              <a:t>today</a:t>
-            </a:r>
-            <a:r>
-              <a:rPr lang="nl-NL" dirty="0"/>
-              <a:t>: Erik Siegel – </a:t>
-            </a:r>
-            <a:r>
-              <a:rPr lang="nl-NL" dirty="0">
-                <a:hlinkClick r:id="rId2"/>
-              </a:rPr>
-              <a:t>erik@xatapult.nl</a:t>
-            </a:r>
-            <a:endParaRPr lang="nl-NL" dirty="0"/>
-          </a:p>
-          <a:p>
-            <a:endParaRPr lang="nl-NL" dirty="0"/>
-          </a:p>
-          <a:p>
-            <a:pPr marL="0" indent="0">
-              <a:buNone/>
-            </a:pPr>
-            <a:r>
-              <a:rPr lang="nl-NL" dirty="0" err="1"/>
-              <a:t>Specification</a:t>
-            </a:r>
-            <a:r>
-              <a:rPr lang="nl-NL" dirty="0"/>
-              <a:t>: </a:t>
-            </a:r>
-            <a:r>
-              <a:rPr lang="en-GB" dirty="0">
-                <a:hlinkClick r:id="rId3"/>
-              </a:rPr>
-              <a:t>https://spec.xproc.org/</a:t>
-            </a:r>
             <a:endParaRPr lang="en-GB" dirty="0"/>
-          </a:p>
-          <a:p>
-            <a:pPr marL="0" indent="0">
-              <a:buNone/>
-            </a:pPr>
-            <a:r>
-              <a:rPr lang="en-GB" dirty="0"/>
-              <a:t>Processors:</a:t>
-            </a:r>
-          </a:p>
-          <a:p>
-            <a:pPr lvl="1"/>
-            <a:r>
-              <a:rPr lang="en-GB" dirty="0"/>
-              <a:t>Morgana: </a:t>
-            </a:r>
-            <a:r>
-              <a:rPr lang="nl-NL" dirty="0">
-                <a:hlinkClick r:id="rId4"/>
-              </a:rPr>
-              <a:t>https://www.xml-project.com/</a:t>
-            </a:r>
-            <a:endParaRPr lang="nl-NL" dirty="0"/>
-          </a:p>
-          <a:p>
-            <a:pPr lvl="1"/>
-            <a:r>
-              <a:rPr lang="nl-NL" dirty="0" err="1"/>
-              <a:t>Calabash</a:t>
-            </a:r>
-            <a:r>
-              <a:rPr lang="nl-NL" dirty="0"/>
-              <a:t>: </a:t>
-            </a:r>
-            <a:r>
-              <a:rPr lang="en-GB" dirty="0">
-                <a:hlinkClick r:id="rId5"/>
-              </a:rPr>
-              <a:t>https://xmlcalabash.com/</a:t>
-            </a:r>
-            <a:endParaRPr lang="en-GB" dirty="0"/>
-          </a:p>
-          <a:p>
-            <a:pPr marL="0" indent="0">
-              <a:buNone/>
-            </a:pPr>
-            <a:r>
-              <a:rPr lang="en-GB" dirty="0"/>
-              <a:t>Articles on XProc: </a:t>
-            </a:r>
-            <a:r>
-              <a:rPr lang="en-GB" dirty="0">
-                <a:hlinkClick r:id="rId6"/>
-              </a:rPr>
-              <a:t>https://www.xml.com</a:t>
-            </a:r>
-            <a:endParaRPr lang="en-GB" dirty="0"/>
-          </a:p>
-          <a:p>
-            <a:pPr marL="0" indent="0">
-              <a:buNone/>
-            </a:pPr>
-            <a:r>
-              <a:rPr lang="en-GB" dirty="0"/>
-              <a:t>Book: </a:t>
-            </a:r>
-            <a:r>
-              <a:rPr lang="en-GB" dirty="0">
-                <a:hlinkClick r:id="rId7"/>
-              </a:rPr>
-              <a:t>https://xmlpress.net/publications/xproc-3-0/</a:t>
-            </a:r>
-            <a:endParaRPr lang="en-GB" dirty="0"/>
-          </a:p>
-        </p:txBody>
-      </p:sp>
-      <p:sp>
-        <p:nvSpPr>
-          <p:cNvPr id="4" name="Speech Bubble: Oval 3">
-            <a:extLst>
-              <a:ext uri="{FF2B5EF4-FFF2-40B4-BE49-F238E27FC236}">
-                <a16:creationId xmlns:a16="http://schemas.microsoft.com/office/drawing/2014/main" id="{75A921EF-31BA-4A7F-95D3-A57EFDE6D66D}"/>
-              </a:ext>
-            </a:extLst>
-          </p:cNvPr>
-          <p:cNvSpPr/>
-          <p:nvPr/>
-        </p:nvSpPr>
-        <p:spPr>
-          <a:xfrm>
-            <a:off x="7548663" y="1780162"/>
-            <a:ext cx="4364477" cy="2289242"/>
-          </a:xfrm>
-          <a:prstGeom prst="wedgeEllipseCallout">
-            <a:avLst>
-              <a:gd name="adj1" fmla="val 43251"/>
-              <a:gd name="adj2" fmla="val 159929"/>
-            </a:avLst>
-          </a:prstGeom>
-        </p:spPr>
-        <p:style>
-          <a:lnRef idx="2">
-            <a:schemeClr val="accent1">
-              <a:shade val="50000"/>
-            </a:schemeClr>
-          </a:lnRef>
-          <a:fillRef idx="1">
-            <a:schemeClr val="accent1"/>
-          </a:fillRef>
-          <a:effectRef idx="0">
-            <a:schemeClr val="accent1"/>
-          </a:effectRef>
-          <a:fontRef idx="minor">
-            <a:schemeClr val="lt1"/>
-          </a:fontRef>
-        </p:style>
-        <p:txBody>
-          <a:bodyPr rtlCol="0" anchor="ctr"/>
-          <a:lstStyle/>
-          <a:p>
-            <a:pPr algn="ctr"/>
-            <a:r>
-              <a:rPr lang="en-US" sz="2800" dirty="0"/>
-              <a:t>See you!</a:t>
-            </a:r>
-          </a:p>
-          <a:p>
-            <a:pPr algn="ctr"/>
-            <a:r>
-              <a:rPr lang="en-US" sz="2800" dirty="0"/>
-              <a:t>And remember, </a:t>
-            </a:r>
-            <a:r>
-              <a:rPr lang="en-US" sz="2800" dirty="0" err="1"/>
-              <a:t>Kanava</a:t>
-            </a:r>
-            <a:r>
-              <a:rPr lang="en-US" sz="2800" dirty="0"/>
-              <a:t> says: </a:t>
-            </a:r>
-          </a:p>
-          <a:p>
-            <a:pPr algn="ctr"/>
-            <a:r>
-              <a:rPr lang="en-US" sz="3200" b="1" i="1" dirty="0"/>
-              <a:t>XProc</a:t>
-            </a:r>
-            <a:r>
-              <a:rPr lang="en-US" sz="2800" b="1" i="1" dirty="0"/>
-              <a:t> </a:t>
-            </a:r>
-            <a:r>
-              <a:rPr lang="en-US" sz="3200" b="1" i="1" dirty="0"/>
-              <a:t>rocks…</a:t>
-            </a:r>
-            <a:r>
-              <a:rPr lang="en-US" sz="2800" b="1" i="1" dirty="0"/>
-              <a:t> </a:t>
-            </a:r>
-            <a:endParaRPr lang="en-NL" sz="2800" b="1" i="1" dirty="0"/>
           </a:p>
         </p:txBody>
       </p:sp>
     </p:spTree>
     <p:extLst>
       <p:ext uri="{BB962C8B-B14F-4D97-AF65-F5344CB8AC3E}">
-        <p14:creationId xmlns:p14="http://schemas.microsoft.com/office/powerpoint/2010/main" val="3036039419"/>
+        <p14:creationId xmlns:p14="http://schemas.microsoft.com/office/powerpoint/2010/main" val="1043788117"/>
       </p:ext>
     </p:extLst>
   </p:cSld>
@@ -9338,7 +10039,7 @@
           <p:cNvPr id="2" name="Title 1">
             <a:extLst>
               <a:ext uri="{FF2B5EF4-FFF2-40B4-BE49-F238E27FC236}">
-                <a16:creationId xmlns:a16="http://schemas.microsoft.com/office/drawing/2014/main" id="{9C7D9E39-AC31-4065-84F2-01C2DA93A3CD}"/>
+                <a16:creationId xmlns:a16="http://schemas.microsoft.com/office/drawing/2014/main" id="{69C1F8C1-9C4C-4D54-8868-98D27E1594F0}"/>
               </a:ext>
             </a:extLst>
           </p:cNvPr>
@@ -9351,8 +10052,8 @@
         </p:nvSpPr>
         <p:spPr>
           <a:xfrm>
-            <a:off x="561109" y="243732"/>
-            <a:ext cx="10515600" cy="948902"/>
+            <a:off x="199743" y="148699"/>
+            <a:ext cx="10515600" cy="868503"/>
           </a:xfrm>
         </p:spPr>
         <p:txBody>
@@ -9361,7 +10062,7 @@
           <a:p>
             <a:r>
               <a:rPr lang="en-US" b="1" dirty="0"/>
-              <a:t>Who Am I?</a:t>
+              <a:t>Goodbye and thank the fish, again!</a:t>
             </a:r>
             <a:endParaRPr lang="en-NL" b="1" dirty="0"/>
           </a:p>
@@ -9372,7 +10073,7 @@
           <p:cNvPr id="3" name="Content Placeholder 2">
             <a:extLst>
               <a:ext uri="{FF2B5EF4-FFF2-40B4-BE49-F238E27FC236}">
-                <a16:creationId xmlns:a16="http://schemas.microsoft.com/office/drawing/2014/main" id="{110338D2-8565-4AF9-91CE-CD583FB0EBFE}"/>
+                <a16:creationId xmlns:a16="http://schemas.microsoft.com/office/drawing/2014/main" id="{EB447546-94E1-423A-8164-617B557A77FC}"/>
               </a:ext>
             </a:extLst>
           </p:cNvPr>
@@ -9385,189 +10086,232 @@
         </p:nvSpPr>
         <p:spPr>
           <a:xfrm>
-            <a:off x="397933" y="1314028"/>
-            <a:ext cx="7596140" cy="4351338"/>
+            <a:off x="713755" y="1253331"/>
+            <a:ext cx="10515600" cy="5093362"/>
           </a:xfrm>
         </p:spPr>
         <p:txBody>
           <a:bodyPr>
-            <a:normAutofit fontScale="85000" lnSpcReduction="20000"/>
+            <a:normAutofit/>
           </a:bodyPr>
           <a:lstStyle/>
           <a:p>
-            <a:r>
-              <a:rPr lang="en-US" dirty="0"/>
-              <a:t>Erik Siegel</a:t>
-            </a:r>
-          </a:p>
-          <a:p>
-            <a:r>
-              <a:rPr lang="en-US" dirty="0"/>
-              <a:t>Content Engineer, XML Specialist, Technical Writer</a:t>
-            </a:r>
-          </a:p>
-          <a:p>
-            <a:r>
-              <a:rPr lang="en-US" dirty="0"/>
-              <a:t>Company: Xatapult</a:t>
-            </a:r>
-          </a:p>
-          <a:p>
-            <a:pPr lvl="1"/>
-            <a:r>
-              <a:rPr lang="en-US" dirty="0"/>
-              <a:t>Groningen, The Netherlands</a:t>
-            </a:r>
-          </a:p>
-          <a:p>
-            <a:pPr lvl="1"/>
-            <a:r>
-              <a:rPr lang="en-US" dirty="0"/>
-              <a:t>Customers mostly in publishing and standardization</a:t>
-            </a:r>
-          </a:p>
-          <a:p>
-            <a:r>
-              <a:rPr lang="en-US" dirty="0"/>
-              <a:t>Part of the XProc 3.0 editing committee</a:t>
-            </a:r>
-          </a:p>
-          <a:p>
-            <a:r>
-              <a:rPr lang="en-US" dirty="0"/>
-              <a:t>Writer of the XProc 3.0 Programmer Reference</a:t>
-            </a:r>
-          </a:p>
-          <a:p>
-            <a:r>
-              <a:rPr lang="en-US" dirty="0"/>
-              <a:t>Contact:</a:t>
-            </a:r>
-          </a:p>
-          <a:p>
-            <a:pPr marL="457200" lvl="1" indent="0">
-              <a:lnSpc>
-                <a:spcPct val="120000"/>
-              </a:lnSpc>
+            <a:pPr marL="0" indent="0">
               <a:buNone/>
             </a:pPr>
             <a:r>
-              <a:rPr lang="en-US" dirty="0">
+              <a:rPr lang="nl-NL" dirty="0" err="1"/>
+              <a:t>Your</a:t>
+            </a:r>
+            <a:r>
+              <a:rPr lang="nl-NL" dirty="0"/>
+              <a:t> guide </a:t>
+            </a:r>
+            <a:r>
+              <a:rPr lang="nl-NL" dirty="0" err="1"/>
+              <a:t>today</a:t>
+            </a:r>
+            <a:r>
+              <a:rPr lang="nl-NL" dirty="0"/>
+              <a:t>: Erik Siegel – </a:t>
+            </a:r>
+            <a:r>
+              <a:rPr lang="nl-NL" dirty="0">
                 <a:hlinkClick r:id="rId2"/>
               </a:rPr>
               <a:t>erik@xatapult.nl</a:t>
             </a:r>
-            <a:br>
-              <a:rPr lang="en-US" dirty="0"/>
-            </a:br>
-            <a:r>
-              <a:rPr lang="en-US" dirty="0">
+            <a:endParaRPr lang="nl-NL" dirty="0"/>
+          </a:p>
+          <a:p>
+            <a:endParaRPr lang="nl-NL" dirty="0"/>
+          </a:p>
+          <a:p>
+            <a:pPr marL="0" indent="0">
+              <a:buNone/>
+            </a:pPr>
+            <a:r>
+              <a:rPr lang="nl-NL" dirty="0" err="1"/>
+              <a:t>Specification</a:t>
+            </a:r>
+            <a:r>
+              <a:rPr lang="nl-NL" dirty="0"/>
+              <a:t>: </a:t>
+            </a:r>
+            <a:r>
+              <a:rPr lang="en-GB" dirty="0">
                 <a:hlinkClick r:id="rId3"/>
               </a:rPr>
-              <a:t>www.xatapult.com</a:t>
-            </a:r>
-            <a:br>
-              <a:rPr lang="en-US" dirty="0"/>
-            </a:br>
+              <a:t>https://spec.xproc.org/</a:t>
+            </a:r>
+            <a:endParaRPr lang="en-GB" dirty="0"/>
+          </a:p>
+          <a:p>
+            <a:pPr marL="0" indent="0">
+              <a:buNone/>
+            </a:pPr>
+            <a:r>
+              <a:rPr lang="en-GB" dirty="0"/>
+              <a:t>Processors:</a:t>
+            </a:r>
+          </a:p>
+          <a:p>
+            <a:pPr lvl="1"/>
+            <a:r>
+              <a:rPr lang="en-GB" dirty="0"/>
+              <a:t>Morgana: </a:t>
+            </a:r>
             <a:r>
               <a:rPr lang="nl-NL" dirty="0">
                 <a:hlinkClick r:id="rId4"/>
               </a:rPr>
-              <a:t>www.linkedin.com/in/esiegel/</a:t>
-            </a:r>
-            <a:br>
-              <a:rPr lang="en-US" dirty="0"/>
-            </a:br>
-            <a:r>
-              <a:rPr lang="en-US" sz="2200" dirty="0"/>
-              <a:t>+31 6 53260792</a:t>
-            </a:r>
-            <a:endParaRPr lang="en-NL" dirty="0"/>
-          </a:p>
-        </p:txBody>
-      </p:sp>
-      <p:pic>
-        <p:nvPicPr>
-          <p:cNvPr id="5" name="Picture 4" descr="A picture containing person, tree, outdoor, plant&#10;&#10;Description automatically generated">
-            <a:extLst>
-              <a:ext uri="{FF2B5EF4-FFF2-40B4-BE49-F238E27FC236}">
-                <a16:creationId xmlns:a16="http://schemas.microsoft.com/office/drawing/2014/main" id="{3FF018FF-B684-4C34-8584-00C9F7DBB523}"/>
-              </a:ext>
-            </a:extLst>
-          </p:cNvPr>
-          <p:cNvPicPr>
-            <a:picLocks noChangeAspect="1"/>
-          </p:cNvPicPr>
+              <a:t>https://www.xml-project.com/</a:t>
+            </a:r>
+            <a:endParaRPr lang="nl-NL" dirty="0"/>
+          </a:p>
+          <a:p>
+            <a:pPr lvl="1"/>
+            <a:r>
+              <a:rPr lang="nl-NL" dirty="0" err="1"/>
+              <a:t>Calabash</a:t>
+            </a:r>
+            <a:r>
+              <a:rPr lang="nl-NL" dirty="0"/>
+              <a:t>: </a:t>
+            </a:r>
+            <a:r>
+              <a:rPr lang="en-GB" dirty="0">
+                <a:hlinkClick r:id="rId5"/>
+              </a:rPr>
+              <a:t>https://xmlcalabash.com/</a:t>
+            </a:r>
+            <a:endParaRPr lang="en-GB" dirty="0"/>
+          </a:p>
+          <a:p>
+            <a:pPr marL="0" indent="0">
+              <a:buNone/>
+            </a:pPr>
+            <a:r>
+              <a:rPr lang="en-GB" dirty="0"/>
+              <a:t>Articles on XProc: </a:t>
+            </a:r>
+            <a:r>
+              <a:rPr lang="en-GB" dirty="0">
+                <a:hlinkClick r:id="rId6"/>
+              </a:rPr>
+              <a:t>https://www.xml.com</a:t>
+            </a:r>
+            <a:endParaRPr lang="en-GB" dirty="0"/>
+          </a:p>
+          <a:p>
+            <a:pPr marL="0" indent="0">
+              <a:buNone/>
+            </a:pPr>
+            <a:r>
+              <a:rPr lang="en-GB" dirty="0"/>
+              <a:t>Book: </a:t>
+            </a:r>
+            <a:r>
+              <a:rPr lang="en-GB" dirty="0">
+                <a:hlinkClick r:id="rId7"/>
+              </a:rPr>
+              <a:t>https://xmlpress.net/publications/xproc-3-0/</a:t>
+            </a:r>
+            <a:endParaRPr lang="en-GB" dirty="0"/>
+          </a:p>
+        </p:txBody>
+      </p:sp>
+      <p:sp>
+        <p:nvSpPr>
+          <p:cNvPr id="4" name="Speech Bubble: Oval 3">
+            <a:extLst>
+              <a:ext uri="{FF2B5EF4-FFF2-40B4-BE49-F238E27FC236}">
+                <a16:creationId xmlns:a16="http://schemas.microsoft.com/office/drawing/2014/main" id="{75A921EF-31BA-4A7F-95D3-A57EFDE6D66D}"/>
+              </a:ext>
+            </a:extLst>
+          </p:cNvPr>
+          <p:cNvSpPr/>
           <p:nvPr/>
-        </p:nvPicPr>
-        <p:blipFill>
-          <a:blip r:embed="rId5">
-            <a:extLst>
-              <a:ext uri="{28A0092B-C50C-407E-A947-70E740481C1C}">
-                <a14:useLocalDpi xmlns:a14="http://schemas.microsoft.com/office/drawing/2010/main" val="0"/>
-              </a:ext>
-            </a:extLst>
-          </a:blip>
-          <a:stretch>
-            <a:fillRect/>
-          </a:stretch>
-        </p:blipFill>
-        <p:spPr>
-          <a:xfrm rot="5400000">
-            <a:off x="9123217" y="683781"/>
-            <a:ext cx="2549239" cy="1911929"/>
-          </a:xfrm>
-          <a:prstGeom prst="rect">
-            <a:avLst/>
+        </p:nvSpPr>
+        <p:spPr>
+          <a:xfrm>
+            <a:off x="7548663" y="1780162"/>
+            <a:ext cx="4364477" cy="2289242"/>
+          </a:xfrm>
+          <a:prstGeom prst="wedgeEllipseCallout">
+            <a:avLst>
+              <a:gd name="adj1" fmla="val 43251"/>
+              <a:gd name="adj2" fmla="val 159929"/>
+            </a:avLst>
           </a:prstGeom>
-          <a:ln>
-            <a:noFill/>
-          </a:ln>
-          <a:effectLst>
-            <a:softEdge rad="112500"/>
-          </a:effectLst>
-        </p:spPr>
-      </p:pic>
-      <p:pic>
-        <p:nvPicPr>
-          <p:cNvPr id="6" name="Picture 5" descr="A close up of a logo&#10;&#10;Description automatically generated">
-            <a:extLst>
-              <a:ext uri="{FF2B5EF4-FFF2-40B4-BE49-F238E27FC236}">
-                <a16:creationId xmlns:a16="http://schemas.microsoft.com/office/drawing/2014/main" id="{AA48229B-4A12-469F-8AC5-7A2676886746}"/>
-              </a:ext>
-            </a:extLst>
-          </p:cNvPr>
-          <p:cNvPicPr>
-            <a:picLocks noChangeAspect="1"/>
-          </p:cNvPicPr>
-          <p:nvPr/>
-        </p:nvPicPr>
-        <p:blipFill>
-          <a:blip r:embed="rId6">
-            <a:extLst>
-              <a:ext uri="{28A0092B-C50C-407E-A947-70E740481C1C}">
-                <a14:useLocalDpi xmlns:a14="http://schemas.microsoft.com/office/drawing/2010/main" val="0"/>
-              </a:ext>
-            </a:extLst>
-          </a:blip>
-          <a:stretch>
-            <a:fillRect/>
-          </a:stretch>
-        </p:blipFill>
-        <p:spPr>
-          <a:xfrm rot="1067824">
-            <a:off x="7246928" y="2925754"/>
-            <a:ext cx="3638738" cy="3831804"/>
-          </a:xfrm>
-          <a:prstGeom prst="rect">
-            <a:avLst/>
-          </a:prstGeom>
-        </p:spPr>
-      </p:pic>
+        </p:spPr>
+        <p:style>
+          <a:lnRef idx="2">
+            <a:schemeClr val="accent1">
+              <a:shade val="50000"/>
+            </a:schemeClr>
+          </a:lnRef>
+          <a:fillRef idx="1">
+            <a:schemeClr val="accent1"/>
+          </a:fillRef>
+          <a:effectRef idx="0">
+            <a:schemeClr val="accent1"/>
+          </a:effectRef>
+          <a:fontRef idx="minor">
+            <a:schemeClr val="lt1"/>
+          </a:fontRef>
+        </p:style>
+        <p:txBody>
+          <a:bodyPr rtlCol="0" anchor="ctr"/>
+          <a:lstStyle/>
+          <a:p>
+            <a:pPr algn="ctr"/>
+            <a:r>
+              <a:rPr lang="en-US" sz="2800" dirty="0"/>
+              <a:t>See you!</a:t>
+            </a:r>
+          </a:p>
+          <a:p>
+            <a:pPr algn="ctr"/>
+            <a:r>
+              <a:rPr lang="en-US" sz="2800" dirty="0"/>
+              <a:t>And remember, </a:t>
+            </a:r>
+            <a:r>
+              <a:rPr lang="en-US" sz="2800" dirty="0" err="1"/>
+              <a:t>Kanava</a:t>
+            </a:r>
+            <a:r>
+              <a:rPr lang="en-US" sz="2800" dirty="0"/>
+              <a:t> says: </a:t>
+            </a:r>
+          </a:p>
+          <a:p>
+            <a:pPr algn="ctr"/>
+            <a:r>
+              <a:rPr lang="en-US" sz="3200" b="1" i="1" dirty="0"/>
+              <a:t>XProc</a:t>
+            </a:r>
+            <a:r>
+              <a:rPr lang="en-US" sz="2800" b="1" i="1" dirty="0"/>
+              <a:t> </a:t>
+            </a:r>
+            <a:r>
+              <a:rPr lang="en-US" sz="3200" b="1" i="1" dirty="0"/>
+              <a:t>rocks…</a:t>
+            </a:r>
+            <a:r>
+              <a:rPr lang="en-US" sz="2800" b="1" i="1" dirty="0"/>
+              <a:t> </a:t>
+            </a:r>
+            <a:endParaRPr lang="en-NL" sz="2800" b="1" i="1" dirty="0"/>
+          </a:p>
+        </p:txBody>
+      </p:sp>
     </p:spTree>
     <p:extLst>
       <p:ext uri="{BB962C8B-B14F-4D97-AF65-F5344CB8AC3E}">
-        <p14:creationId xmlns:p14="http://schemas.microsoft.com/office/powerpoint/2010/main" val="372394686"/>
+        <p14:creationId xmlns:p14="http://schemas.microsoft.com/office/powerpoint/2010/main" val="3036039419"/>
       </p:ext>
     </p:extLst>
   </p:cSld>
@@ -9963,7 +10707,15 @@
             <a:pPr algn="ctr"/>
             <a:r>
               <a:rPr lang="en-US" sz="2000" dirty="0"/>
-              <a:t>And most important: I’m </a:t>
+              <a:t>And </a:t>
+            </a:r>
+            <a:r>
+              <a:rPr lang="en-US" sz="2000" b="1" i="1" dirty="0"/>
+              <a:t>most</a:t>
+            </a:r>
+            <a:r>
+              <a:rPr lang="en-US" sz="2000" dirty="0"/>
+              <a:t> important: I’m </a:t>
             </a:r>
             <a:r>
               <a:rPr lang="en-US" sz="2000" dirty="0" err="1"/>
@@ -9985,6 +10737,267 @@
     <p:extLst>
       <p:ext uri="{BB962C8B-B14F-4D97-AF65-F5344CB8AC3E}">
         <p14:creationId xmlns:p14="http://schemas.microsoft.com/office/powerpoint/2010/main" val="2318689730"/>
+      </p:ext>
+    </p:extLst>
+  </p:cSld>
+  <p:clrMapOvr>
+    <a:masterClrMapping/>
+  </p:clrMapOvr>
+</p:sld>
+</file>
+
+<file path=ppt/slides/slide20.xml><?xml version="1.0" encoding="utf-8"?>
+<p:sld xmlns:a="http://schemas.openxmlformats.org/drawingml/2006/main" xmlns:r="http://schemas.openxmlformats.org/officeDocument/2006/relationships" xmlns:p="http://schemas.openxmlformats.org/presentationml/2006/main">
+  <p:cSld>
+    <p:spTree>
+      <p:nvGrpSpPr>
+        <p:cNvPr id="1" name=""/>
+        <p:cNvGrpSpPr/>
+        <p:nvPr/>
+      </p:nvGrpSpPr>
+      <p:grpSpPr>
+        <a:xfrm>
+          <a:off x="0" y="0"/>
+          <a:ext cx="0" cy="0"/>
+          <a:chOff x="0" y="0"/>
+          <a:chExt cx="0" cy="0"/>
+        </a:xfrm>
+      </p:grpSpPr>
+      <p:sp>
+        <p:nvSpPr>
+          <p:cNvPr id="2" name="Title 1">
+            <a:extLst>
+              <a:ext uri="{FF2B5EF4-FFF2-40B4-BE49-F238E27FC236}">
+                <a16:creationId xmlns:a16="http://schemas.microsoft.com/office/drawing/2014/main" id="{9C7D9E39-AC31-4065-84F2-01C2DA93A3CD}"/>
+              </a:ext>
+            </a:extLst>
+          </p:cNvPr>
+          <p:cNvSpPr>
+            <a:spLocks noGrp="1"/>
+          </p:cNvSpPr>
+          <p:nvPr>
+            <p:ph type="title"/>
+          </p:nvPr>
+        </p:nvSpPr>
+        <p:spPr>
+          <a:xfrm>
+            <a:off x="561109" y="243732"/>
+            <a:ext cx="10515600" cy="948902"/>
+          </a:xfrm>
+        </p:spPr>
+        <p:txBody>
+          <a:bodyPr/>
+          <a:lstStyle/>
+          <a:p>
+            <a:r>
+              <a:rPr lang="en-US" b="1" dirty="0"/>
+              <a:t>Who Am I?</a:t>
+            </a:r>
+            <a:endParaRPr lang="en-NL" b="1" dirty="0"/>
+          </a:p>
+        </p:txBody>
+      </p:sp>
+      <p:sp>
+        <p:nvSpPr>
+          <p:cNvPr id="3" name="Content Placeholder 2">
+            <a:extLst>
+              <a:ext uri="{FF2B5EF4-FFF2-40B4-BE49-F238E27FC236}">
+                <a16:creationId xmlns:a16="http://schemas.microsoft.com/office/drawing/2014/main" id="{110338D2-8565-4AF9-91CE-CD583FB0EBFE}"/>
+              </a:ext>
+            </a:extLst>
+          </p:cNvPr>
+          <p:cNvSpPr>
+            <a:spLocks noGrp="1"/>
+          </p:cNvSpPr>
+          <p:nvPr>
+            <p:ph idx="1"/>
+          </p:nvPr>
+        </p:nvSpPr>
+        <p:spPr>
+          <a:xfrm>
+            <a:off x="397933" y="1314028"/>
+            <a:ext cx="7596140" cy="4351338"/>
+          </a:xfrm>
+        </p:spPr>
+        <p:txBody>
+          <a:bodyPr>
+            <a:normAutofit fontScale="85000" lnSpcReduction="20000"/>
+          </a:bodyPr>
+          <a:lstStyle/>
+          <a:p>
+            <a:r>
+              <a:rPr lang="en-US" dirty="0"/>
+              <a:t>Erik Siegel</a:t>
+            </a:r>
+          </a:p>
+          <a:p>
+            <a:r>
+              <a:rPr lang="en-US" dirty="0"/>
+              <a:t>Content Engineer, XML Specialist, Technical Writer</a:t>
+            </a:r>
+          </a:p>
+          <a:p>
+            <a:r>
+              <a:rPr lang="en-US" dirty="0"/>
+              <a:t>Company: Xatapult</a:t>
+            </a:r>
+          </a:p>
+          <a:p>
+            <a:pPr lvl="1"/>
+            <a:r>
+              <a:rPr lang="en-US" dirty="0"/>
+              <a:t>Groningen, The Netherlands</a:t>
+            </a:r>
+          </a:p>
+          <a:p>
+            <a:pPr lvl="1"/>
+            <a:r>
+              <a:rPr lang="en-US" dirty="0"/>
+              <a:t>Customers mostly in publishing and standardization</a:t>
+            </a:r>
+          </a:p>
+          <a:p>
+            <a:r>
+              <a:rPr lang="en-US" dirty="0"/>
+              <a:t>Part of the XProc 3.0 editing committee</a:t>
+            </a:r>
+          </a:p>
+          <a:p>
+            <a:r>
+              <a:rPr lang="en-US" dirty="0"/>
+              <a:t>Writer of the XProc 3.0 Programmer Reference</a:t>
+            </a:r>
+          </a:p>
+          <a:p>
+            <a:r>
+              <a:rPr lang="en-US" dirty="0"/>
+              <a:t>Contact:</a:t>
+            </a:r>
+          </a:p>
+          <a:p>
+            <a:pPr marL="457200" lvl="1" indent="0">
+              <a:lnSpc>
+                <a:spcPct val="120000"/>
+              </a:lnSpc>
+              <a:buNone/>
+            </a:pPr>
+            <a:r>
+              <a:rPr lang="en-US" dirty="0">
+                <a:hlinkClick r:id="rId2"/>
+              </a:rPr>
+              <a:t>erik@xatapult.nl</a:t>
+            </a:r>
+            <a:br>
+              <a:rPr lang="en-US" dirty="0"/>
+            </a:br>
+            <a:r>
+              <a:rPr lang="en-US" dirty="0">
+                <a:hlinkClick r:id="rId3"/>
+              </a:rPr>
+              <a:t>www.xatapult.com</a:t>
+            </a:r>
+            <a:br>
+              <a:rPr lang="en-US" dirty="0"/>
+            </a:br>
+            <a:r>
+              <a:rPr lang="nl-NL" dirty="0">
+                <a:hlinkClick r:id="rId4"/>
+              </a:rPr>
+              <a:t>www.linkedin.com/in/esiegel/</a:t>
+            </a:r>
+            <a:br>
+              <a:rPr lang="en-US" dirty="0"/>
+            </a:br>
+            <a:r>
+              <a:rPr lang="en-US" sz="2200" dirty="0"/>
+              <a:t>+31 6 53260792</a:t>
+            </a:r>
+            <a:endParaRPr lang="en-NL" dirty="0"/>
+          </a:p>
+        </p:txBody>
+      </p:sp>
+      <p:pic>
+        <p:nvPicPr>
+          <p:cNvPr id="5" name="Picture 4" descr="A picture containing person, tree, outdoor, plant&#10;&#10;Description automatically generated">
+            <a:extLst>
+              <a:ext uri="{FF2B5EF4-FFF2-40B4-BE49-F238E27FC236}">
+                <a16:creationId xmlns:a16="http://schemas.microsoft.com/office/drawing/2014/main" id="{3FF018FF-B684-4C34-8584-00C9F7DBB523}"/>
+              </a:ext>
+            </a:extLst>
+          </p:cNvPr>
+          <p:cNvPicPr>
+            <a:picLocks noChangeAspect="1"/>
+          </p:cNvPicPr>
+          <p:nvPr/>
+        </p:nvPicPr>
+        <p:blipFill>
+          <a:blip r:embed="rId5">
+            <a:extLst>
+              <a:ext uri="{28A0092B-C50C-407E-A947-70E740481C1C}">
+                <a14:useLocalDpi xmlns:a14="http://schemas.microsoft.com/office/drawing/2010/main" val="0"/>
+              </a:ext>
+            </a:extLst>
+          </a:blip>
+          <a:stretch>
+            <a:fillRect/>
+          </a:stretch>
+        </p:blipFill>
+        <p:spPr>
+          <a:xfrm rot="5400000">
+            <a:off x="9123217" y="683781"/>
+            <a:ext cx="2549239" cy="1911929"/>
+          </a:xfrm>
+          <a:prstGeom prst="rect">
+            <a:avLst/>
+          </a:prstGeom>
+          <a:ln>
+            <a:noFill/>
+          </a:ln>
+          <a:effectLst>
+            <a:softEdge rad="112500"/>
+          </a:effectLst>
+        </p:spPr>
+      </p:pic>
+      <p:pic>
+        <p:nvPicPr>
+          <p:cNvPr id="6" name="Picture 5" descr="A close up of a logo&#10;&#10;Description automatically generated">
+            <a:extLst>
+              <a:ext uri="{FF2B5EF4-FFF2-40B4-BE49-F238E27FC236}">
+                <a16:creationId xmlns:a16="http://schemas.microsoft.com/office/drawing/2014/main" id="{AA48229B-4A12-469F-8AC5-7A2676886746}"/>
+              </a:ext>
+            </a:extLst>
+          </p:cNvPr>
+          <p:cNvPicPr>
+            <a:picLocks noChangeAspect="1"/>
+          </p:cNvPicPr>
+          <p:nvPr/>
+        </p:nvPicPr>
+        <p:blipFill>
+          <a:blip r:embed="rId6">
+            <a:extLst>
+              <a:ext uri="{28A0092B-C50C-407E-A947-70E740481C1C}">
+                <a14:useLocalDpi xmlns:a14="http://schemas.microsoft.com/office/drawing/2010/main" val="0"/>
+              </a:ext>
+            </a:extLst>
+          </a:blip>
+          <a:stretch>
+            <a:fillRect/>
+          </a:stretch>
+        </p:blipFill>
+        <p:spPr>
+          <a:xfrm rot="1067824">
+            <a:off x="7246928" y="2925754"/>
+            <a:ext cx="3638738" cy="3831804"/>
+          </a:xfrm>
+          <a:prstGeom prst="rect">
+            <a:avLst/>
+          </a:prstGeom>
+        </p:spPr>
+      </p:pic>
+    </p:spTree>
+    <p:extLst>
+      <p:ext uri="{BB962C8B-B14F-4D97-AF65-F5344CB8AC3E}">
+        <p14:creationId xmlns:p14="http://schemas.microsoft.com/office/powerpoint/2010/main" val="372394686"/>
       </p:ext>
     </p:extLst>
   </p:cSld>

</xml_diff>